<commit_message>
Adds diagrams to OSI slides in cybersecurity-iacs
</commit_message>
<xml_diff>
--- a/cybersecurity-iacs/Rod/OSI_Security_Model.pptx
+++ b/cybersecurity-iacs/Rod/OSI_Security_Model.pptx
@@ -5,46 +5,48 @@
     <p:sldMasterId id="2147483648" r:id="rId1"/>
   </p:sldMasterIdLst>
   <p:notesMasterIdLst>
-    <p:notesMasterId r:id="rId6"/>
+    <p:notesMasterId r:id="rId36"/>
   </p:notesMasterIdLst>
   <p:handoutMasterIdLst>
-    <p:handoutMasterId r:id="rId36"/>
+    <p:handoutMasterId r:id="rId37"/>
   </p:handoutMasterIdLst>
   <p:sldIdLst>
-    <p:sldId id="256" r:id="rId3"/>
-    <p:sldId id="277" r:id="rId4"/>
-    <p:sldId id="257" r:id="rId5"/>
-    <p:sldId id="258" r:id="rId7"/>
-    <p:sldId id="259" r:id="rId8"/>
-    <p:sldId id="260" r:id="rId9"/>
-    <p:sldId id="261" r:id="rId10"/>
-    <p:sldId id="262" r:id="rId11"/>
-    <p:sldId id="263" r:id="rId12"/>
-    <p:sldId id="264" r:id="rId13"/>
-    <p:sldId id="265" r:id="rId14"/>
-    <p:sldId id="266" r:id="rId15"/>
-    <p:sldId id="267" r:id="rId16"/>
-    <p:sldId id="278" r:id="rId17"/>
-    <p:sldId id="268" r:id="rId18"/>
-    <p:sldId id="269" r:id="rId19"/>
-    <p:sldId id="270" r:id="rId20"/>
-    <p:sldId id="271" r:id="rId21"/>
-    <p:sldId id="273" r:id="rId22"/>
-    <p:sldId id="279" r:id="rId23"/>
-    <p:sldId id="272" r:id="rId24"/>
-    <p:sldId id="275" r:id="rId25"/>
-    <p:sldId id="276" r:id="rId26"/>
-    <p:sldId id="280" r:id="rId27"/>
-    <p:sldId id="274" r:id="rId28"/>
-    <p:sldId id="281" r:id="rId29"/>
-    <p:sldId id="282" r:id="rId30"/>
-    <p:sldId id="283" r:id="rId31"/>
-    <p:sldId id="284" r:id="rId32"/>
-    <p:sldId id="285" r:id="rId33"/>
-    <p:sldId id="286" r:id="rId34"/>
-    <p:sldId id="287" r:id="rId35"/>
+    <p:sldId id="256" r:id="rId2"/>
+    <p:sldId id="277" r:id="rId3"/>
+    <p:sldId id="257" r:id="rId4"/>
+    <p:sldId id="258" r:id="rId5"/>
+    <p:sldId id="259" r:id="rId6"/>
+    <p:sldId id="260" r:id="rId7"/>
+    <p:sldId id="261" r:id="rId8"/>
+    <p:sldId id="262" r:id="rId9"/>
+    <p:sldId id="263" r:id="rId10"/>
+    <p:sldId id="264" r:id="rId11"/>
+    <p:sldId id="265" r:id="rId12"/>
+    <p:sldId id="266" r:id="rId13"/>
+    <p:sldId id="267" r:id="rId14"/>
+    <p:sldId id="278" r:id="rId15"/>
+    <p:sldId id="268" r:id="rId16"/>
+    <p:sldId id="269" r:id="rId17"/>
+    <p:sldId id="270" r:id="rId18"/>
+    <p:sldId id="271" r:id="rId19"/>
+    <p:sldId id="273" r:id="rId20"/>
+    <p:sldId id="279" r:id="rId21"/>
+    <p:sldId id="272" r:id="rId22"/>
+    <p:sldId id="275" r:id="rId23"/>
+    <p:sldId id="276" r:id="rId24"/>
+    <p:sldId id="280" r:id="rId25"/>
+    <p:sldId id="274" r:id="rId26"/>
+    <p:sldId id="281" r:id="rId27"/>
+    <p:sldId id="282" r:id="rId28"/>
+    <p:sldId id="283" r:id="rId29"/>
+    <p:sldId id="284" r:id="rId30"/>
+    <p:sldId id="285" r:id="rId31"/>
+    <p:sldId id="286" r:id="rId32"/>
+    <p:sldId id="287" r:id="rId33"/>
+    <p:sldId id="288" r:id="rId34"/>
+    <p:sldId id="289" r:id="rId35"/>
   </p:sldIdLst>
-  <p:sldSz cx="9372600" cy="8297545"/>
+  <p:sldSz cx="9372600" cy="8297863"/>
   <p:notesSz cx="7315200" cy="9601200"/>
   <p:defaultTextStyle>
     <a:defPPr>
@@ -171,6 +173,36 @@
       </a:defRPr>
     </a:lvl9pPr>
   </p:defaultTextStyle>
+  <p:extLst>
+    <p:ext uri="{EFAFB233-063F-42B5-8137-9DF3F51BA10A}">
+      <p15:sldGuideLst xmlns:p15="http://schemas.microsoft.com/office/powerpoint/2012/main">
+        <p15:guide id="1" orient="horz" pos="2614">
+          <p15:clr>
+            <a:srgbClr val="A4A3A4"/>
+          </p15:clr>
+        </p15:guide>
+        <p15:guide id="2" pos="2952">
+          <p15:clr>
+            <a:srgbClr val="A4A3A4"/>
+          </p15:clr>
+        </p15:guide>
+      </p15:sldGuideLst>
+    </p:ext>
+    <p:ext uri="{2D200454-40CA-4A62-9FC3-DE9A4176ACB9}">
+      <p15:notesGuideLst xmlns:p15="http://schemas.microsoft.com/office/powerpoint/2012/main">
+        <p15:guide id="1" orient="horz" pos="3024">
+          <p15:clr>
+            <a:srgbClr val="A4A3A4"/>
+          </p15:clr>
+        </p15:guide>
+        <p15:guide id="2" pos="2308">
+          <p15:clr>
+            <a:srgbClr val="A4A3A4"/>
+          </p15:clr>
+        </p15:guide>
+      </p15:notesGuideLst>
+    </p:ext>
+  </p:extLst>
 </p:presentation>
 </file>
 
@@ -250,7 +282,6 @@
               <a:rPr lang="en-US" dirty="0"/>
               <a:t>Copyright © 2017 Elephant Scale. All rights reserved.</a:t>
             </a:r>
-            <a:endParaRPr lang="en-US" dirty="0"/>
           </a:p>
         </p:txBody>
       </p:sp>
@@ -293,12 +324,18 @@
             </a:pPr>
             <a:fld id="{97E62689-8C7D-4291-A094-4E689FEC4C3B}" type="slidenum">
               <a:rPr lang="en-US"/>
+              <a:t>‹#›</a:t>
             </a:fld>
             <a:endParaRPr lang="en-US" dirty="0"/>
           </a:p>
         </p:txBody>
       </p:sp>
     </p:spTree>
+    <p:extLst>
+      <p:ext uri="{BB962C8B-B14F-4D97-AF65-F5344CB8AC3E}">
+        <p14:creationId xmlns:p14="http://schemas.microsoft.com/office/powerpoint/2010/main" val="1"/>
+      </p:ext>
+    </p:extLst>
   </p:cSld>
   <p:clrMap bg1="lt1" tx1="dk1" bg2="lt2" tx2="dk2" accent1="accent1" accent2="accent2" accent3="accent3" accent4="accent4" accent5="accent5" accent6="accent6" hlink="hlink" folHlink="folHlink"/>
   <p:hf hdr="0" ftr="0" dt="0"/>
@@ -399,7 +436,6 @@
               <a:rPr lang="en-US" dirty="0"/>
               <a:t>Copyright © 2017 Elephant Scale. All rights reserved.</a:t>
             </a:r>
-            <a:endParaRPr lang="en-US" dirty="0"/>
           </a:p>
         </p:txBody>
       </p:sp>
@@ -443,6 +479,7 @@
             </a:pPr>
             <a:fld id="{EFAADD5D-AF76-45EE-AA5F-6DAC73BF167A}" type="slidenum">
               <a:rPr lang="en-US"/>
+              <a:t>‹#›</a:t>
             </a:fld>
             <a:endParaRPr lang="en-US" dirty="0"/>
           </a:p>
@@ -484,10 +521,6 @@
               </a:rPr>
               <a:t>Notes:</a:t>
             </a:r>
-            <a:endParaRPr lang="en-US" sz="1200" b="1" u="sng" dirty="0">
-              <a:latin typeface="Times New Roman" panose="02020603050405020304" pitchFamily="-110" charset="0"/>
-              <a:cs typeface="Times New Roman" panose="02020603050405020304" pitchFamily="-110" charset="0"/>
-            </a:endParaRPr>
           </a:p>
         </p:txBody>
       </p:sp>
@@ -749,7 +782,6 @@
               <a:rPr lang="en-US" dirty="0"/>
               <a:t>Image credit: https://superuser.com/questions/874393/what-protocol-is-used-to-transfer-a-message-in-a-http-application</a:t>
             </a:r>
-            <a:endParaRPr lang="en-US" dirty="0"/>
           </a:p>
           <a:p>
             <a:r>
@@ -806,6 +838,7 @@
             </a:pPr>
             <a:fld id="{EFAADD5D-AF76-45EE-AA5F-6DAC73BF167A}" type="slidenum">
               <a:rPr lang="en-US" smtClean="0"/>
+              <a:t>3</a:t>
             </a:fld>
             <a:endParaRPr lang="en-US" dirty="0"/>
           </a:p>
@@ -917,6 +950,7 @@
             </a:pPr>
             <a:fld id="{EFAADD5D-AF76-45EE-AA5F-6DAC73BF167A}" type="slidenum">
               <a:rPr lang="en-US" smtClean="0"/>
+              <a:t>12</a:t>
             </a:fld>
             <a:endParaRPr lang="en-US" dirty="0"/>
           </a:p>
@@ -1028,6 +1062,7 @@
             </a:pPr>
             <a:fld id="{EFAADD5D-AF76-45EE-AA5F-6DAC73BF167A}" type="slidenum">
               <a:rPr lang="en-US" smtClean="0"/>
+              <a:t>17</a:t>
             </a:fld>
             <a:endParaRPr lang="en-US" dirty="0"/>
           </a:p>
@@ -1135,6 +1170,7 @@
             </a:pPr>
             <a:fld id="{EFAADD5D-AF76-45EE-AA5F-6DAC73BF167A}" type="slidenum">
               <a:rPr lang="en-US" smtClean="0"/>
+              <a:t>18</a:t>
             </a:fld>
             <a:endParaRPr lang="en-US" dirty="0"/>
           </a:p>
@@ -1242,6 +1278,7 @@
             </a:pPr>
             <a:fld id="{EFAADD5D-AF76-45EE-AA5F-6DAC73BF167A}" type="slidenum">
               <a:rPr lang="en-US" smtClean="0"/>
+              <a:t>19</a:t>
             </a:fld>
             <a:endParaRPr lang="en-US" dirty="0"/>
           </a:p>
@@ -1349,6 +1386,7 @@
             </a:pPr>
             <a:fld id="{EFAADD5D-AF76-45EE-AA5F-6DAC73BF167A}" type="slidenum">
               <a:rPr lang="en-US" smtClean="0"/>
+              <a:t>21</a:t>
             </a:fld>
             <a:endParaRPr lang="en-US" dirty="0"/>
           </a:p>
@@ -1456,6 +1494,7 @@
             </a:pPr>
             <a:fld id="{EFAADD5D-AF76-45EE-AA5F-6DAC73BF167A}" type="slidenum">
               <a:rPr lang="en-US" smtClean="0"/>
+              <a:t>22</a:t>
             </a:fld>
             <a:endParaRPr lang="en-US" dirty="0"/>
           </a:p>
@@ -1563,6 +1602,7 @@
             </a:pPr>
             <a:fld id="{EFAADD5D-AF76-45EE-AA5F-6DAC73BF167A}" type="slidenum">
               <a:rPr lang="en-US" smtClean="0"/>
+              <a:t>23</a:t>
             </a:fld>
             <a:endParaRPr lang="en-US" dirty="0"/>
           </a:p>
@@ -1670,12 +1710,247 @@
             </a:pPr>
             <a:fld id="{EFAADD5D-AF76-45EE-AA5F-6DAC73BF167A}" type="slidenum">
               <a:rPr lang="en-US" smtClean="0"/>
+              <a:t>25</a:t>
             </a:fld>
             <a:endParaRPr lang="en-US" dirty="0"/>
           </a:p>
         </p:txBody>
       </p:sp>
     </p:spTree>
+  </p:cSld>
+  <p:clrMapOvr>
+    <a:masterClrMapping/>
+  </p:clrMapOvr>
+</p:notes>
+</file>
+
+<file path=ppt/notesSlides/notesSlide18.xml><?xml version="1.0" encoding="utf-8"?>
+<p:notes xmlns:a="http://schemas.openxmlformats.org/drawingml/2006/main" xmlns:r="http://schemas.openxmlformats.org/officeDocument/2006/relationships" xmlns:p="http://schemas.openxmlformats.org/presentationml/2006/main">
+  <p:cSld>
+    <p:spTree>
+      <p:nvGrpSpPr>
+        <p:cNvPr id="1" name=""/>
+        <p:cNvGrpSpPr/>
+        <p:nvPr/>
+      </p:nvGrpSpPr>
+      <p:grpSpPr>
+        <a:xfrm>
+          <a:off x="0" y="0"/>
+          <a:ext cx="0" cy="0"/>
+          <a:chOff x="0" y="0"/>
+          <a:chExt cx="0" cy="0"/>
+        </a:xfrm>
+      </p:grpSpPr>
+      <p:sp>
+        <p:nvSpPr>
+          <p:cNvPr id="2" name="Slide Image Placeholder 1"/>
+          <p:cNvSpPr>
+            <a:spLocks noGrp="1" noRot="1" noChangeAspect="1"/>
+          </p:cNvSpPr>
+          <p:nvPr>
+            <p:ph type="sldImg"/>
+          </p:nvPr>
+        </p:nvSpPr>
+        <p:spPr/>
+      </p:sp>
+      <p:sp>
+        <p:nvSpPr>
+          <p:cNvPr id="3" name="Notes Placeholder 2"/>
+          <p:cNvSpPr>
+            <a:spLocks noGrp="1"/>
+          </p:cNvSpPr>
+          <p:nvPr>
+            <p:ph type="body" idx="1"/>
+          </p:nvPr>
+        </p:nvSpPr>
+        <p:spPr/>
+        <p:txBody>
+          <a:bodyPr/>
+          <a:lstStyle/>
+          <a:p>
+            <a:r>
+              <a:rPr lang="en-US" dirty="0"/>
+              <a:t>Taken from https://www.helpnetsecurity.com/2021/09/14/osi-layer-1/</a:t>
+            </a:r>
+            <a:endParaRPr lang="en-CA" dirty="0"/>
+          </a:p>
+        </p:txBody>
+      </p:sp>
+      <p:sp>
+        <p:nvSpPr>
+          <p:cNvPr id="4" name="Footer Placeholder 3"/>
+          <p:cNvSpPr>
+            <a:spLocks noGrp="1"/>
+          </p:cNvSpPr>
+          <p:nvPr>
+            <p:ph type="ftr" sz="quarter" idx="4"/>
+          </p:nvPr>
+        </p:nvSpPr>
+        <p:spPr/>
+        <p:txBody>
+          <a:bodyPr/>
+          <a:lstStyle/>
+          <a:p>
+            <a:pPr>
+              <a:defRPr/>
+            </a:pPr>
+            <a:r>
+              <a:rPr lang="en-US"/>
+              <a:t>Copyright © 2017 Elephant Scale. All rights reserved.</a:t>
+            </a:r>
+            <a:endParaRPr lang="en-US" dirty="0"/>
+          </a:p>
+        </p:txBody>
+      </p:sp>
+      <p:sp>
+        <p:nvSpPr>
+          <p:cNvPr id="5" name="Slide Number Placeholder 4"/>
+          <p:cNvSpPr>
+            <a:spLocks noGrp="1"/>
+          </p:cNvSpPr>
+          <p:nvPr>
+            <p:ph type="sldNum" sz="quarter" idx="5"/>
+          </p:nvPr>
+        </p:nvSpPr>
+        <p:spPr/>
+        <p:txBody>
+          <a:bodyPr/>
+          <a:lstStyle/>
+          <a:p>
+            <a:pPr>
+              <a:defRPr/>
+            </a:pPr>
+            <a:fld id="{EFAADD5D-AF76-45EE-AA5F-6DAC73BF167A}" type="slidenum">
+              <a:rPr lang="en-US" smtClean="0"/>
+              <a:t>33</a:t>
+            </a:fld>
+            <a:endParaRPr lang="en-US" dirty="0"/>
+          </a:p>
+        </p:txBody>
+      </p:sp>
+    </p:spTree>
+    <p:extLst>
+      <p:ext uri="{BB962C8B-B14F-4D97-AF65-F5344CB8AC3E}">
+        <p14:creationId xmlns:p14="http://schemas.microsoft.com/office/powerpoint/2010/main" val="2103000125"/>
+      </p:ext>
+    </p:extLst>
+  </p:cSld>
+  <p:clrMapOvr>
+    <a:masterClrMapping/>
+  </p:clrMapOvr>
+</p:notes>
+</file>
+
+<file path=ppt/notesSlides/notesSlide19.xml><?xml version="1.0" encoding="utf-8"?>
+<p:notes xmlns:a="http://schemas.openxmlformats.org/drawingml/2006/main" xmlns:r="http://schemas.openxmlformats.org/officeDocument/2006/relationships" xmlns:p="http://schemas.openxmlformats.org/presentationml/2006/main">
+  <p:cSld>
+    <p:spTree>
+      <p:nvGrpSpPr>
+        <p:cNvPr id="1" name=""/>
+        <p:cNvGrpSpPr/>
+        <p:nvPr/>
+      </p:nvGrpSpPr>
+      <p:grpSpPr>
+        <a:xfrm>
+          <a:off x="0" y="0"/>
+          <a:ext cx="0" cy="0"/>
+          <a:chOff x="0" y="0"/>
+          <a:chExt cx="0" cy="0"/>
+        </a:xfrm>
+      </p:grpSpPr>
+      <p:sp>
+        <p:nvSpPr>
+          <p:cNvPr id="2" name="Slide Image Placeholder 1"/>
+          <p:cNvSpPr>
+            <a:spLocks noGrp="1" noRot="1" noChangeAspect="1"/>
+          </p:cNvSpPr>
+          <p:nvPr>
+            <p:ph type="sldImg"/>
+          </p:nvPr>
+        </p:nvSpPr>
+        <p:spPr/>
+      </p:sp>
+      <p:sp>
+        <p:nvSpPr>
+          <p:cNvPr id="3" name="Notes Placeholder 2"/>
+          <p:cNvSpPr>
+            <a:spLocks noGrp="1"/>
+          </p:cNvSpPr>
+          <p:nvPr>
+            <p:ph type="body" idx="1"/>
+          </p:nvPr>
+        </p:nvSpPr>
+        <p:spPr/>
+        <p:txBody>
+          <a:bodyPr/>
+          <a:lstStyle/>
+          <a:p>
+            <a:r>
+              <a:rPr lang="en-US" dirty="0"/>
+              <a:t>Taken from https://www.helpnetsecurity.com/2021/09/14/osi-layer-1/</a:t>
+            </a:r>
+            <a:endParaRPr lang="en-CA" dirty="0"/>
+          </a:p>
+        </p:txBody>
+      </p:sp>
+      <p:sp>
+        <p:nvSpPr>
+          <p:cNvPr id="4" name="Footer Placeholder 3"/>
+          <p:cNvSpPr>
+            <a:spLocks noGrp="1"/>
+          </p:cNvSpPr>
+          <p:nvPr>
+            <p:ph type="ftr" sz="quarter" idx="4"/>
+          </p:nvPr>
+        </p:nvSpPr>
+        <p:spPr/>
+        <p:txBody>
+          <a:bodyPr/>
+          <a:lstStyle/>
+          <a:p>
+            <a:pPr>
+              <a:defRPr/>
+            </a:pPr>
+            <a:r>
+              <a:rPr lang="en-US"/>
+              <a:t>Copyright © 2017 Elephant Scale. All rights reserved.</a:t>
+            </a:r>
+            <a:endParaRPr lang="en-US" dirty="0"/>
+          </a:p>
+        </p:txBody>
+      </p:sp>
+      <p:sp>
+        <p:nvSpPr>
+          <p:cNvPr id="5" name="Slide Number Placeholder 4"/>
+          <p:cNvSpPr>
+            <a:spLocks noGrp="1"/>
+          </p:cNvSpPr>
+          <p:nvPr>
+            <p:ph type="sldNum" sz="quarter" idx="5"/>
+          </p:nvPr>
+        </p:nvSpPr>
+        <p:spPr/>
+        <p:txBody>
+          <a:bodyPr/>
+          <a:lstStyle/>
+          <a:p>
+            <a:pPr>
+              <a:defRPr/>
+            </a:pPr>
+            <a:fld id="{EFAADD5D-AF76-45EE-AA5F-6DAC73BF167A}" type="slidenum">
+              <a:rPr lang="en-US" smtClean="0"/>
+              <a:t>34</a:t>
+            </a:fld>
+            <a:endParaRPr lang="en-US" dirty="0"/>
+          </a:p>
+        </p:txBody>
+      </p:sp>
+    </p:spTree>
+    <p:extLst>
+      <p:ext uri="{BB962C8B-B14F-4D97-AF65-F5344CB8AC3E}">
+        <p14:creationId xmlns:p14="http://schemas.microsoft.com/office/powerpoint/2010/main" val="455039626"/>
+      </p:ext>
+    </p:extLst>
   </p:cSld>
   <p:clrMapOvr>
     <a:masterClrMapping/>
@@ -1731,7 +2006,6 @@
               <a:rPr lang="en-US" dirty="0"/>
               <a:t>Image Credit: https://nicolaswindpassinger.com/osi-reference-model</a:t>
             </a:r>
-            <a:endParaRPr lang="en-US" dirty="0"/>
           </a:p>
           <a:p>
             <a:endParaRPr lang="en-US" dirty="0"/>
@@ -1784,6 +2058,7 @@
             </a:pPr>
             <a:fld id="{EFAADD5D-AF76-45EE-AA5F-6DAC73BF167A}" type="slidenum">
               <a:rPr lang="en-US" smtClean="0"/>
+              <a:t>4</a:t>
             </a:fld>
             <a:endParaRPr lang="en-US" dirty="0"/>
           </a:p>
@@ -1845,7 +2120,6 @@
               <a:rPr lang="en-US" dirty="0"/>
               <a:t>Image Credit: https://nicolaswindpassinger.com/osi-reference-model</a:t>
             </a:r>
-            <a:endParaRPr lang="en-US" dirty="0"/>
           </a:p>
         </p:txBody>
       </p:sp>
@@ -1895,6 +2169,7 @@
             </a:pPr>
             <a:fld id="{EFAADD5D-AF76-45EE-AA5F-6DAC73BF167A}" type="slidenum">
               <a:rPr lang="en-US" smtClean="0"/>
+              <a:t>5</a:t>
             </a:fld>
             <a:endParaRPr lang="en-US" dirty="0"/>
           </a:p>
@@ -2006,6 +2281,7 @@
             </a:pPr>
             <a:fld id="{EFAADD5D-AF76-45EE-AA5F-6DAC73BF167A}" type="slidenum">
               <a:rPr lang="en-US" smtClean="0"/>
+              <a:t>6</a:t>
             </a:fld>
             <a:endParaRPr lang="en-US" dirty="0"/>
           </a:p>
@@ -2117,6 +2393,7 @@
             </a:pPr>
             <a:fld id="{EFAADD5D-AF76-45EE-AA5F-6DAC73BF167A}" type="slidenum">
               <a:rPr lang="en-US" smtClean="0"/>
+              <a:t>7</a:t>
             </a:fld>
             <a:endParaRPr lang="en-US" dirty="0"/>
           </a:p>
@@ -2228,6 +2505,7 @@
             </a:pPr>
             <a:fld id="{EFAADD5D-AF76-45EE-AA5F-6DAC73BF167A}" type="slidenum">
               <a:rPr lang="en-US" smtClean="0"/>
+              <a:t>8</a:t>
             </a:fld>
             <a:endParaRPr lang="en-US" dirty="0"/>
           </a:p>
@@ -2339,6 +2617,7 @@
             </a:pPr>
             <a:fld id="{EFAADD5D-AF76-45EE-AA5F-6DAC73BF167A}" type="slidenum">
               <a:rPr lang="en-US" smtClean="0"/>
+              <a:t>9</a:t>
             </a:fld>
             <a:endParaRPr lang="en-US" dirty="0"/>
           </a:p>
@@ -2450,6 +2729,7 @@
             </a:pPr>
             <a:fld id="{EFAADD5D-AF76-45EE-AA5F-6DAC73BF167A}" type="slidenum">
               <a:rPr lang="en-US" smtClean="0"/>
+              <a:t>10</a:t>
             </a:fld>
             <a:endParaRPr lang="en-US" dirty="0"/>
           </a:p>
@@ -2561,6 +2841,7 @@
             </a:pPr>
             <a:fld id="{EFAADD5D-AF76-45EE-AA5F-6DAC73BF167A}" type="slidenum">
               <a:rPr lang="en-US" smtClean="0"/>
+              <a:t>11</a:t>
             </a:fld>
             <a:endParaRPr lang="en-US" dirty="0"/>
           </a:p>
@@ -2575,7 +2856,7 @@
 </file>
 
 <file path=ppt/slideLayouts/slideLayout1.xml><?xml version="1.0" encoding="utf-8"?>
-<p:sldLayout xmlns:a="http://schemas.openxmlformats.org/drawingml/2006/main" xmlns:r="http://schemas.openxmlformats.org/officeDocument/2006/relationships" xmlns:p="http://schemas.openxmlformats.org/presentationml/2006/main" type="title" preserve="1" showMasterSp="0">
+<p:sldLayout xmlns:a="http://schemas.openxmlformats.org/drawingml/2006/main" xmlns:r="http://schemas.openxmlformats.org/officeDocument/2006/relationships" xmlns:p="http://schemas.openxmlformats.org/presentationml/2006/main" showMasterSp="0" type="title" preserve="1">
   <p:cSld name="Title Slide">
     <p:bg>
       <p:bgPr>
@@ -2663,7 +2944,6 @@
               <a:rPr lang="en-US"/>
               <a:t>Click to edit Master subtitle style</a:t>
             </a:r>
-            <a:endParaRPr lang="en-US"/>
           </a:p>
         </p:txBody>
       </p:sp>
@@ -2695,7 +2975,6 @@
               <a:rPr lang="en-US"/>
               <a:t>Click to edit Master title style</a:t>
             </a:r>
-            <a:endParaRPr lang="en-US"/>
           </a:p>
         </p:txBody>
       </p:sp>
@@ -2746,7 +3025,6 @@
               <a:rPr lang="en-US" dirty="0"/>
               <a:t>Click to edit Master title style</a:t>
             </a:r>
-            <a:endParaRPr lang="en-US" dirty="0"/>
           </a:p>
         </p:txBody>
       </p:sp>
@@ -2770,7 +3048,6 @@
               <a:rPr lang="en-US" dirty="0"/>
               <a:t>Click to edit Master text styles</a:t>
             </a:r>
-            <a:endParaRPr lang="en-US" dirty="0"/>
           </a:p>
           <a:p>
             <a:pPr lvl="1"/>
@@ -2778,7 +3055,6 @@
               <a:rPr lang="en-US" dirty="0"/>
               <a:t>Second level</a:t>
             </a:r>
-            <a:endParaRPr lang="en-US" dirty="0"/>
           </a:p>
           <a:p>
             <a:pPr lvl="2"/>
@@ -2786,7 +3062,6 @@
               <a:rPr lang="en-US" dirty="0"/>
               <a:t>Third level</a:t>
             </a:r>
-            <a:endParaRPr lang="en-US" dirty="0"/>
           </a:p>
           <a:p>
             <a:pPr lvl="3"/>
@@ -2794,7 +3069,6 @@
               <a:rPr lang="en-US" dirty="0"/>
               <a:t>Fourth level</a:t>
             </a:r>
-            <a:endParaRPr lang="en-US" dirty="0"/>
           </a:p>
           <a:p>
             <a:pPr lvl="4"/>
@@ -2802,7 +3076,6 @@
               <a:rPr lang="en-US" dirty="0"/>
               <a:t>Fifth level</a:t>
             </a:r>
-            <a:endParaRPr lang="en-US" dirty="0"/>
           </a:p>
         </p:txBody>
       </p:sp>
@@ -2828,7 +3101,6 @@
               <a:rPr lang="en-US" dirty="0"/>
               <a:t>Copyright © 2021 Elephant Scale. All rights reserved.</a:t>
             </a:r>
-            <a:endParaRPr lang="en-US" dirty="0"/>
           </a:p>
         </p:txBody>
       </p:sp>
@@ -2852,6 +3124,7 @@
             </a:pPr>
             <a:fld id="{77EF9825-4C23-4085-A4E3-B5565466BD91}" type="slidenum">
               <a:rPr lang="en-US" smtClean="0"/>
+              <a:t>‹#›</a:t>
             </a:fld>
             <a:endParaRPr lang="en-US" dirty="0"/>
           </a:p>
@@ -2907,7 +3180,6 @@
               <a:rPr lang="en-US"/>
               <a:t>Click to edit Master title style</a:t>
             </a:r>
-            <a:endParaRPr lang="en-US"/>
           </a:p>
         </p:txBody>
       </p:sp>
@@ -2936,7 +3208,6 @@
               <a:rPr lang="en-US"/>
               <a:t>Click to edit Master text styles</a:t>
             </a:r>
-            <a:endParaRPr lang="en-US"/>
           </a:p>
           <a:p>
             <a:pPr lvl="1"/>
@@ -2944,7 +3215,6 @@
               <a:rPr lang="en-US"/>
               <a:t>Second level</a:t>
             </a:r>
-            <a:endParaRPr lang="en-US"/>
           </a:p>
           <a:p>
             <a:pPr lvl="2"/>
@@ -2952,7 +3222,6 @@
               <a:rPr lang="en-US"/>
               <a:t>Third level</a:t>
             </a:r>
-            <a:endParaRPr lang="en-US"/>
           </a:p>
           <a:p>
             <a:pPr lvl="3"/>
@@ -2960,7 +3229,6 @@
               <a:rPr lang="en-US"/>
               <a:t>Fourth level</a:t>
             </a:r>
-            <a:endParaRPr lang="en-US"/>
           </a:p>
           <a:p>
             <a:pPr lvl="4"/>
@@ -2968,7 +3236,6 @@
               <a:rPr lang="en-US"/>
               <a:t>Fifth level</a:t>
             </a:r>
-            <a:endParaRPr lang="en-US"/>
           </a:p>
         </p:txBody>
       </p:sp>
@@ -2997,7 +3264,6 @@
               <a:rPr lang="en-US"/>
               <a:t>Click to edit Master text styles</a:t>
             </a:r>
-            <a:endParaRPr lang="en-US"/>
           </a:p>
           <a:p>
             <a:pPr lvl="1"/>
@@ -3005,7 +3271,6 @@
               <a:rPr lang="en-US"/>
               <a:t>Second level</a:t>
             </a:r>
-            <a:endParaRPr lang="en-US"/>
           </a:p>
           <a:p>
             <a:pPr lvl="2"/>
@@ -3013,7 +3278,6 @@
               <a:rPr lang="en-US"/>
               <a:t>Third level</a:t>
             </a:r>
-            <a:endParaRPr lang="en-US"/>
           </a:p>
           <a:p>
             <a:pPr lvl="3"/>
@@ -3021,7 +3285,6 @@
               <a:rPr lang="en-US"/>
               <a:t>Fourth level</a:t>
             </a:r>
-            <a:endParaRPr lang="en-US"/>
           </a:p>
           <a:p>
             <a:pPr lvl="4"/>
@@ -3029,7 +3292,6 @@
               <a:rPr lang="en-US"/>
               <a:t>Fifth level</a:t>
             </a:r>
-            <a:endParaRPr lang="en-US"/>
           </a:p>
         </p:txBody>
       </p:sp>
@@ -3058,7 +3320,6 @@
               <a:rPr lang="en-US"/>
               <a:t>Click to edit Master text styles</a:t>
             </a:r>
-            <a:endParaRPr lang="en-US"/>
           </a:p>
           <a:p>
             <a:pPr lvl="1"/>
@@ -3066,7 +3327,6 @@
               <a:rPr lang="en-US"/>
               <a:t>Second level</a:t>
             </a:r>
-            <a:endParaRPr lang="en-US"/>
           </a:p>
           <a:p>
             <a:pPr lvl="2"/>
@@ -3074,7 +3334,6 @@
               <a:rPr lang="en-US"/>
               <a:t>Third level</a:t>
             </a:r>
-            <a:endParaRPr lang="en-US"/>
           </a:p>
           <a:p>
             <a:pPr lvl="3"/>
@@ -3082,7 +3341,6 @@
               <a:rPr lang="en-US"/>
               <a:t>Fourth level</a:t>
             </a:r>
-            <a:endParaRPr lang="en-US"/>
           </a:p>
           <a:p>
             <a:pPr lvl="4"/>
@@ -3090,7 +3348,6 @@
               <a:rPr lang="en-US"/>
               <a:t>Fifth level</a:t>
             </a:r>
-            <a:endParaRPr lang="en-US"/>
           </a:p>
         </p:txBody>
       </p:sp>
@@ -3118,6 +3375,7 @@
             </a:pPr>
             <a:fld id="{040E4B02-67B9-4228-B08B-2561CEE6B946}" type="slidenum">
               <a:rPr lang="en-US"/>
+              <a:t>‹#›</a:t>
             </a:fld>
             <a:endParaRPr lang="en-US" dirty="0"/>
           </a:p>
@@ -3149,7 +3407,6 @@
               <a:rPr lang="en-US" dirty="0"/>
               <a:t>Copyright © 2021 Elephant Scale. All rights reserved.</a:t>
             </a:r>
-            <a:endParaRPr lang="en-US" dirty="0"/>
           </a:p>
         </p:txBody>
       </p:sp>
@@ -3203,7 +3460,6 @@
               <a:rPr lang="en-US"/>
               <a:t>Click to edit Master title style</a:t>
             </a:r>
-            <a:endParaRPr lang="en-US"/>
           </a:p>
         </p:txBody>
       </p:sp>
@@ -3232,7 +3488,6 @@
               <a:rPr lang="en-US"/>
               <a:t>Click to edit Master text styles</a:t>
             </a:r>
-            <a:endParaRPr lang="en-US"/>
           </a:p>
           <a:p>
             <a:pPr lvl="1"/>
@@ -3240,7 +3495,6 @@
               <a:rPr lang="en-US"/>
               <a:t>Second level</a:t>
             </a:r>
-            <a:endParaRPr lang="en-US"/>
           </a:p>
           <a:p>
             <a:pPr lvl="2"/>
@@ -3248,7 +3502,6 @@
               <a:rPr lang="en-US"/>
               <a:t>Third level</a:t>
             </a:r>
-            <a:endParaRPr lang="en-US"/>
           </a:p>
           <a:p>
             <a:pPr lvl="3"/>
@@ -3256,7 +3509,6 @@
               <a:rPr lang="en-US"/>
               <a:t>Fourth level</a:t>
             </a:r>
-            <a:endParaRPr lang="en-US"/>
           </a:p>
           <a:p>
             <a:pPr lvl="4"/>
@@ -3264,7 +3516,6 @@
               <a:rPr lang="en-US"/>
               <a:t>Fifth level</a:t>
             </a:r>
-            <a:endParaRPr lang="en-US"/>
           </a:p>
         </p:txBody>
       </p:sp>
@@ -3293,7 +3544,6 @@
               <a:rPr lang="en-US"/>
               <a:t>Click to edit Master text styles</a:t>
             </a:r>
-            <a:endParaRPr lang="en-US"/>
           </a:p>
           <a:p>
             <a:pPr lvl="1"/>
@@ -3301,7 +3551,6 @@
               <a:rPr lang="en-US"/>
               <a:t>Second level</a:t>
             </a:r>
-            <a:endParaRPr lang="en-US"/>
           </a:p>
           <a:p>
             <a:pPr lvl="2"/>
@@ -3309,7 +3558,6 @@
               <a:rPr lang="en-US"/>
               <a:t>Third level</a:t>
             </a:r>
-            <a:endParaRPr lang="en-US"/>
           </a:p>
           <a:p>
             <a:pPr lvl="3"/>
@@ -3317,7 +3565,6 @@
               <a:rPr lang="en-US"/>
               <a:t>Fourth level</a:t>
             </a:r>
-            <a:endParaRPr lang="en-US"/>
           </a:p>
           <a:p>
             <a:pPr lvl="4"/>
@@ -3325,7 +3572,6 @@
               <a:rPr lang="en-US"/>
               <a:t>Fifth level</a:t>
             </a:r>
-            <a:endParaRPr lang="en-US"/>
           </a:p>
         </p:txBody>
       </p:sp>
@@ -3353,6 +3599,7 @@
             </a:pPr>
             <a:fld id="{A86CC632-9864-46F1-8EAB-FCD3BB9CEC9A}" type="slidenum">
               <a:rPr lang="en-US"/>
+              <a:t>‹#›</a:t>
             </a:fld>
             <a:endParaRPr lang="en-US" dirty="0"/>
           </a:p>
@@ -3384,7 +3631,6 @@
               <a:rPr lang="en-US" dirty="0"/>
               <a:t>Copyright © 2021 Elephant Scale. All rights reserved.</a:t>
             </a:r>
-            <a:endParaRPr lang="en-US" dirty="0"/>
           </a:p>
         </p:txBody>
       </p:sp>
@@ -3457,7 +3703,6 @@
               <a:rPr lang="en-US" dirty="0"/>
               <a:t>Click to edit Master text styles</a:t>
             </a:r>
-            <a:endParaRPr lang="en-US" dirty="0"/>
           </a:p>
           <a:p>
             <a:pPr lvl="1"/>
@@ -3465,7 +3710,6 @@
               <a:rPr lang="en-US" dirty="0"/>
               <a:t>Second level</a:t>
             </a:r>
-            <a:endParaRPr lang="en-US" dirty="0"/>
           </a:p>
           <a:p>
             <a:pPr lvl="2"/>
@@ -3473,7 +3717,6 @@
               <a:rPr lang="en-US" dirty="0"/>
               <a:t>Third level</a:t>
             </a:r>
-            <a:endParaRPr lang="en-US" dirty="0"/>
           </a:p>
           <a:p>
             <a:pPr lvl="3"/>
@@ -3481,7 +3724,6 @@
               <a:rPr lang="en-US" dirty="0"/>
               <a:t>Fourth level</a:t>
             </a:r>
-            <a:endParaRPr lang="en-US" dirty="0"/>
           </a:p>
           <a:p>
             <a:pPr lvl="4"/>
@@ -3489,7 +3731,6 @@
               <a:rPr lang="en-US" dirty="0"/>
               <a:t>Fifth level</a:t>
             </a:r>
-            <a:endParaRPr lang="en-US" dirty="0"/>
           </a:p>
         </p:txBody>
       </p:sp>
@@ -3538,6 +3779,7 @@
             </a:pPr>
             <a:fld id="{77EF9825-4C23-4085-A4E3-B5565466BD91}" type="slidenum">
               <a:rPr lang="en-US"/>
+              <a:t>‹#›</a:t>
             </a:fld>
             <a:endParaRPr lang="en-US" dirty="0"/>
           </a:p>
@@ -3595,7 +3837,6 @@
               <a:rPr lang="en-US" dirty="0"/>
               <a:t>Copyright © 2021 Elephant Scale. All rights reserved.</a:t>
             </a:r>
-            <a:endParaRPr lang="en-US" dirty="0"/>
           </a:p>
         </p:txBody>
       </p:sp>
@@ -3608,7 +3849,7 @@
           <p:nvPr/>
         </p:nvPicPr>
         <p:blipFill>
-          <a:blip r:embed="rId5"/>
+          <a:blip r:embed="rId6"/>
           <a:srcRect/>
           <a:stretch>
             <a:fillRect/>
@@ -3666,7 +3907,6 @@
               <a:rPr lang="en-US" dirty="0"/>
               <a:t>Click to edit Master title style</a:t>
             </a:r>
-            <a:endParaRPr lang="en-US" dirty="0"/>
           </a:p>
         </p:txBody>
       </p:sp>
@@ -4123,7 +4363,9 @@
         <p:txBody>
           <a:bodyPr/>
           <a:lstStyle/>
-          <a:p/>
+          <a:p>
+            <a:endParaRPr/>
+          </a:p>
         </p:txBody>
       </p:sp>
       <p:sp>
@@ -4179,11 +4421,6 @@
               </a:rPr>
               <a:t>Copyright © 2021 by Elephant Scale, All Rights Reserved</a:t>
             </a:r>
-            <a:endParaRPr sz="800">
-              <a:solidFill>
-                <a:srgbClr val="000000"/>
-              </a:solidFill>
-            </a:endParaRPr>
           </a:p>
         </p:txBody>
       </p:sp>
@@ -4254,14 +4491,12 @@
               <a:rPr lang="en-US" dirty="0"/>
               <a:t>Responsible for routing and transferring data packets between different nodes across various networks</a:t>
             </a:r>
-            <a:endParaRPr lang="en-US" dirty="0"/>
           </a:p>
           <a:p>
             <a:r>
               <a:rPr lang="en-US" dirty="0"/>
               <a:t>Includes the IP the Internet Protocol part of TCP/IP</a:t>
             </a:r>
-            <a:endParaRPr lang="en-US" dirty="0"/>
           </a:p>
           <a:p>
             <a:r>
@@ -4283,7 +4518,7 @@
           </p:nvPr>
         </p:nvPicPr>
         <p:blipFill>
-          <a:blip r:embed="rId1"/>
+          <a:blip r:embed="rId3"/>
           <a:stretch>
             <a:fillRect/>
           </a:stretch>
@@ -4315,6 +4550,7 @@
             </a:pPr>
             <a:fld id="{77EF9825-4C23-4085-A4E3-B5565466BD91}" type="slidenum">
               <a:rPr lang="en-US" smtClean="0"/>
+              <a:t>10</a:t>
             </a:fld>
             <a:endParaRPr lang="en-US" dirty="0"/>
           </a:p>
@@ -4473,14 +4709,12 @@
               <a:rPr lang="en-US" dirty="0"/>
               <a:t>Later where data transfer between two directly connected nodes in a network takes place</a:t>
             </a:r>
-            <a:endParaRPr lang="en-US" dirty="0"/>
           </a:p>
           <a:p>
             <a:r>
               <a:rPr lang="en-US" dirty="0"/>
               <a:t>Divided into two sub layers: </a:t>
             </a:r>
-            <a:endParaRPr lang="en-US" dirty="0"/>
           </a:p>
           <a:p>
             <a:pPr lvl="1"/>
@@ -4488,7 +4722,6 @@
               <a:rPr lang="en-US" dirty="0"/>
               <a:t>Medium access control layer (MAC layer)</a:t>
             </a:r>
-            <a:endParaRPr lang="en-US" dirty="0"/>
           </a:p>
           <a:p>
             <a:pPr lvl="1"/>
@@ -4496,14 +4729,12 @@
               <a:rPr lang="en-US" dirty="0"/>
               <a:t>Logical link control layer (LLC). </a:t>
             </a:r>
-            <a:endParaRPr lang="en-US" dirty="0"/>
           </a:p>
           <a:p>
             <a:r>
               <a:rPr lang="en-US" dirty="0"/>
               <a:t>Various IEEE 802 standards apply to this layer</a:t>
             </a:r>
-            <a:endParaRPr lang="en-US" dirty="0"/>
           </a:p>
           <a:p>
             <a:pPr lvl="1"/>
@@ -4511,7 +4742,6 @@
               <a:rPr lang="en-US" dirty="0"/>
               <a:t>IEEE 802.15.4 or low rate Wireless PAN for example</a:t>
             </a:r>
-            <a:endParaRPr lang="en-US" dirty="0"/>
           </a:p>
           <a:p>
             <a:endParaRPr lang="en-CA" dirty="0"/>
@@ -4529,7 +4759,7 @@
           </p:nvPr>
         </p:nvPicPr>
         <p:blipFill>
-          <a:blip r:embed="rId1"/>
+          <a:blip r:embed="rId3"/>
           <a:stretch>
             <a:fillRect/>
           </a:stretch>
@@ -4561,6 +4791,7 @@
             </a:pPr>
             <a:fld id="{77EF9825-4C23-4085-A4E3-B5565466BD91}" type="slidenum">
               <a:rPr lang="en-US" smtClean="0"/>
+              <a:t>11</a:t>
             </a:fld>
             <a:endParaRPr lang="en-US" dirty="0"/>
           </a:p>
@@ -4719,21 +4950,18 @@
               <a:rPr lang="en-US" dirty="0"/>
               <a:t>Layer where networks are organized</a:t>
             </a:r>
-            <a:endParaRPr lang="en-US" dirty="0"/>
           </a:p>
           <a:p>
             <a:r>
               <a:rPr lang="en-US" dirty="0"/>
               <a:t>Foundation of IoT and its connected </a:t>
             </a:r>
-            <a:endParaRPr lang="en-US" dirty="0"/>
           </a:p>
           <a:p>
             <a:r>
               <a:rPr lang="en-US" dirty="0"/>
               <a:t>Includes the essential physical structure needed to make the IoT possible</a:t>
             </a:r>
-            <a:endParaRPr lang="en-US" dirty="0"/>
           </a:p>
           <a:p>
             <a:pPr lvl="1"/>
@@ -4741,7 +4969,6 @@
               <a:rPr lang="en-US" dirty="0"/>
               <a:t>E.g., cables and radio frequency links</a:t>
             </a:r>
-            <a:endParaRPr lang="en-US" dirty="0"/>
           </a:p>
           <a:p>
             <a:pPr lvl="1"/>
@@ -4764,7 +4991,7 @@
           </p:nvPr>
         </p:nvPicPr>
         <p:blipFill>
-          <a:blip r:embed="rId1"/>
+          <a:blip r:embed="rId3"/>
           <a:stretch>
             <a:fillRect/>
           </a:stretch>
@@ -4796,6 +5023,7 @@
             </a:pPr>
             <a:fld id="{77EF9825-4C23-4085-A4E3-B5565466BD91}" type="slidenum">
               <a:rPr lang="en-US" smtClean="0"/>
+              <a:t>12</a:t>
             </a:fld>
             <a:endParaRPr lang="en-US" dirty="0"/>
           </a:p>
@@ -4952,7 +5180,6 @@
               <a:rPr lang="en-US" dirty="0"/>
               <a:t>Using OSI to figure out why an application isn’t working</a:t>
             </a:r>
-            <a:endParaRPr lang="en-US" dirty="0"/>
           </a:p>
           <a:p>
             <a:pPr marL="342900" lvl="1" indent="0">
@@ -4962,7 +5189,6 @@
               <a:rPr lang="en-US" dirty="0"/>
               <a:t>Layer 1: Physical</a:t>
             </a:r>
-            <a:endParaRPr lang="en-US" dirty="0"/>
           </a:p>
           <a:p>
             <a:pPr marL="342900" lvl="1" indent="0">
@@ -4972,7 +5198,6 @@
               <a:rPr lang="en-US" dirty="0"/>
               <a:t>	Is the network cable plugged in?</a:t>
             </a:r>
-            <a:endParaRPr lang="en-US" dirty="0"/>
           </a:p>
           <a:p>
             <a:pPr marL="342900" lvl="1" indent="0">
@@ -4982,7 +5207,6 @@
               <a:rPr lang="en-US" dirty="0"/>
               <a:t>Layer 2: Data Link</a:t>
             </a:r>
-            <a:endParaRPr lang="en-US" dirty="0"/>
           </a:p>
           <a:p>
             <a:pPr marL="342900" lvl="1" indent="0">
@@ -4992,7 +5216,6 @@
               <a:rPr lang="en-US" dirty="0"/>
               <a:t>	Do you have a link light?</a:t>
             </a:r>
-            <a:endParaRPr lang="en-US" dirty="0"/>
           </a:p>
           <a:p>
             <a:pPr marL="342900" lvl="1" indent="0">
@@ -5002,7 +5225,6 @@
               <a:rPr lang="en-US" dirty="0"/>
               <a:t>Layer 3: Network</a:t>
             </a:r>
-            <a:endParaRPr lang="en-US" dirty="0"/>
           </a:p>
           <a:p>
             <a:pPr marL="342900" lvl="1" indent="0">
@@ -5012,7 +5234,6 @@
               <a:rPr lang="en-US" dirty="0"/>
               <a:t>	Are you getting an IP?</a:t>
             </a:r>
-            <a:endParaRPr lang="en-US" dirty="0"/>
           </a:p>
           <a:p>
             <a:pPr marL="342900" lvl="1" indent="0">
@@ -5022,7 +5243,6 @@
               <a:rPr lang="en-US" dirty="0"/>
               <a:t>Layer 4: Transport</a:t>
             </a:r>
-            <a:endParaRPr lang="en-US" dirty="0"/>
           </a:p>
           <a:p>
             <a:pPr marL="342900" lvl="1" indent="0">
@@ -5032,7 +5252,6 @@
               <a:rPr lang="en-US" dirty="0"/>
               <a:t>	Can you connect to your default gateway?</a:t>
             </a:r>
-            <a:endParaRPr lang="en-US" dirty="0"/>
           </a:p>
           <a:p>
             <a:pPr marL="342900" lvl="1" indent="0">
@@ -5042,7 +5261,6 @@
               <a:rPr lang="en-US" dirty="0"/>
               <a:t>Layer 5: Session</a:t>
             </a:r>
-            <a:endParaRPr lang="en-US" dirty="0"/>
           </a:p>
           <a:p>
             <a:pPr marL="342900" lvl="1" indent="0">
@@ -5052,7 +5270,6 @@
               <a:rPr lang="en-US" dirty="0"/>
               <a:t>	Do you have DNS server information? </a:t>
             </a:r>
-            <a:endParaRPr lang="en-US" dirty="0"/>
           </a:p>
           <a:p>
             <a:pPr marL="342900" lvl="1" indent="0">
@@ -5062,7 +5279,6 @@
               <a:rPr lang="en-US" dirty="0"/>
               <a:t>	Can you ping 4.2.2.2 but not google.com?</a:t>
             </a:r>
-            <a:endParaRPr lang="en-US" dirty="0"/>
           </a:p>
           <a:p>
             <a:pPr marL="342900" lvl="1" indent="0">
@@ -5072,7 +5288,6 @@
               <a:rPr lang="en-US" dirty="0"/>
               <a:t>Layers 6&amp;7: Presentation &amp; Application – </a:t>
             </a:r>
-            <a:endParaRPr lang="en-US" dirty="0"/>
           </a:p>
           <a:p>
             <a:pPr marL="342900" lvl="1" indent="0">
@@ -5082,7 +5297,6 @@
               <a:rPr lang="en-US" dirty="0"/>
               <a:t>	Can you browse to a site? </a:t>
             </a:r>
-            <a:endParaRPr lang="en-US" dirty="0"/>
           </a:p>
           <a:p>
             <a:pPr marL="0" indent="0">
@@ -5145,6 +5359,7 @@
             </a:pPr>
             <a:fld id="{A86CC632-9864-46F1-8EAB-FCD3BB9CEC9A}" type="slidenum">
               <a:rPr lang="en-US" smtClean="0"/>
+              <a:t>13</a:t>
             </a:fld>
             <a:endParaRPr lang="en-US" dirty="0"/>
           </a:p>
@@ -5277,6 +5492,7 @@
             </a:pPr>
             <a:fld id="{77EF9825-4C23-4085-A4E3-B5565466BD91}" type="slidenum">
               <a:rPr lang="en-US" smtClean="0"/>
+              <a:t>14</a:t>
             </a:fld>
             <a:endParaRPr lang="en-US" dirty="0"/>
           </a:p>
@@ -5376,6 +5592,7 @@
             </a:pPr>
             <a:fld id="{A86CC632-9864-46F1-8EAB-FCD3BB9CEC9A}" type="slidenum">
               <a:rPr lang="en-US" smtClean="0"/>
+              <a:t>15</a:t>
             </a:fld>
             <a:endParaRPr lang="en-US" dirty="0"/>
           </a:p>
@@ -5400,9 +5617,27 @@
                 <a:tableStyleId>{5C22544A-7EE6-4342-B048-85BDC9FD1C3A}</a:tableStyleId>
               </a:tblPr>
               <a:tblGrid>
-                <a:gridCol w="920503"/>
-                <a:gridCol w="1687590"/>
-                <a:gridCol w="5292895"/>
+                <a:gridCol w="920503">
+                  <a:extLst>
+                    <a:ext uri="{9D8B030D-6E8A-4147-A177-3AD203B41FA5}">
+                      <a16:colId xmlns:a16="http://schemas.microsoft.com/office/drawing/2014/main" val="20000"/>
+                    </a:ext>
+                  </a:extLst>
+                </a:gridCol>
+                <a:gridCol w="1687590">
+                  <a:extLst>
+                    <a:ext uri="{9D8B030D-6E8A-4147-A177-3AD203B41FA5}">
+                      <a16:colId xmlns:a16="http://schemas.microsoft.com/office/drawing/2014/main" val="20001"/>
+                    </a:ext>
+                  </a:extLst>
+                </a:gridCol>
+                <a:gridCol w="5292895">
+                  <a:extLst>
+                    <a:ext uri="{9D8B030D-6E8A-4147-A177-3AD203B41FA5}">
+                      <a16:colId xmlns:a16="http://schemas.microsoft.com/office/drawing/2014/main" val="20002"/>
+                    </a:ext>
+                  </a:extLst>
+                </a:gridCol>
               </a:tblGrid>
               <a:tr h="434340">
                 <a:tc>
@@ -5450,6 +5685,11 @@
                   </a:txBody>
                   <a:tcPr/>
                 </a:tc>
+                <a:extLst>
+                  <a:ext uri="{0D108BD9-81ED-4DB2-BD59-A6C34878D82A}">
+                    <a16:rowId xmlns:a16="http://schemas.microsoft.com/office/drawing/2014/main" val="10000"/>
+                  </a:ext>
+                </a:extLst>
               </a:tr>
               <a:tr h="480060">
                 <a:tc>
@@ -5500,7 +5740,6 @@
                         <a:rPr lang="en-US" dirty="0"/>
                         <a:t>/Password sniffing.</a:t>
                       </a:r>
-                      <a:endParaRPr lang="en-US" dirty="0"/>
                     </a:p>
                     <a:p>
                       <a:pPr algn="ctr"/>
@@ -5508,7 +5747,6 @@
                         <a:rPr lang="en-US" dirty="0"/>
                         <a:t>Lack of role-based security for admin and support.</a:t>
                       </a:r>
-                      <a:endParaRPr lang="en-US" dirty="0"/>
                     </a:p>
                     <a:p>
                       <a:pPr algn="ctr"/>
@@ -5521,6 +5759,11 @@
                   </a:txBody>
                   <a:tcPr/>
                 </a:tc>
+                <a:extLst>
+                  <a:ext uri="{0D108BD9-81ED-4DB2-BD59-A6C34878D82A}">
+                    <a16:rowId xmlns:a16="http://schemas.microsoft.com/office/drawing/2014/main" val="10001"/>
+                  </a:ext>
+                </a:extLst>
               </a:tr>
               <a:tr h="434340">
                 <a:tc>
@@ -5563,7 +5806,6 @@
                         <a:rPr lang="en-US" dirty="0"/>
                         <a:t>Phishing, TLS/SSL sniffing</a:t>
                       </a:r>
-                      <a:endParaRPr lang="en-US" dirty="0"/>
                     </a:p>
                     <a:p>
                       <a:pPr algn="ctr"/>
@@ -5576,6 +5818,11 @@
                   </a:txBody>
                   <a:tcPr/>
                 </a:tc>
+                <a:extLst>
+                  <a:ext uri="{0D108BD9-81ED-4DB2-BD59-A6C34878D82A}">
+                    <a16:rowId xmlns:a16="http://schemas.microsoft.com/office/drawing/2014/main" val="10002"/>
+                  </a:ext>
+                </a:extLst>
               </a:tr>
               <a:tr h="434340">
                 <a:tc>
@@ -5618,7 +5865,6 @@
                         <a:rPr lang="en-US" dirty="0"/>
                         <a:t>Hacking – Telnet and FTP hacking</a:t>
                       </a:r>
-                      <a:endParaRPr lang="en-US" dirty="0"/>
                     </a:p>
                     <a:p>
                       <a:pPr algn="ctr"/>
@@ -5631,6 +5877,11 @@
                   </a:txBody>
                   <a:tcPr/>
                 </a:tc>
+                <a:extLst>
+                  <a:ext uri="{0D108BD9-81ED-4DB2-BD59-A6C34878D82A}">
+                    <a16:rowId xmlns:a16="http://schemas.microsoft.com/office/drawing/2014/main" val="10003"/>
+                  </a:ext>
+                </a:extLst>
               </a:tr>
               <a:tr h="434340">
                 <a:tc>
@@ -5673,7 +5924,6 @@
                         <a:rPr lang="en-US" dirty="0"/>
                         <a:t>TCP Sessions sniffing</a:t>
                       </a:r>
-                      <a:endParaRPr lang="en-US" dirty="0"/>
                     </a:p>
                     <a:p>
                       <a:pPr algn="ctr"/>
@@ -5686,6 +5936,11 @@
                   </a:txBody>
                   <a:tcPr/>
                 </a:tc>
+                <a:extLst>
+                  <a:ext uri="{0D108BD9-81ED-4DB2-BD59-A6C34878D82A}">
+                    <a16:rowId xmlns:a16="http://schemas.microsoft.com/office/drawing/2014/main" val="10004"/>
+                  </a:ext>
+                </a:extLst>
               </a:tr>
               <a:tr h="434340">
                 <a:tc>
@@ -5728,7 +5983,6 @@
                         <a:rPr lang="en-US" dirty="0"/>
                         <a:t>Man in the Middle Attacks</a:t>
                       </a:r>
-                      <a:endParaRPr lang="en-US" dirty="0"/>
                     </a:p>
                     <a:p>
                       <a:pPr algn="ctr"/>
@@ -5741,6 +5995,11 @@
                   </a:txBody>
                   <a:tcPr/>
                 </a:tc>
+                <a:extLst>
+                  <a:ext uri="{0D108BD9-81ED-4DB2-BD59-A6C34878D82A}">
+                    <a16:rowId xmlns:a16="http://schemas.microsoft.com/office/drawing/2014/main" val="10005"/>
+                  </a:ext>
+                </a:extLst>
               </a:tr>
               <a:tr h="434340">
                 <a:tc>
@@ -5788,6 +6047,11 @@
                   </a:txBody>
                   <a:tcPr/>
                 </a:tc>
+                <a:extLst>
+                  <a:ext uri="{0D108BD9-81ED-4DB2-BD59-A6C34878D82A}">
+                    <a16:rowId xmlns:a16="http://schemas.microsoft.com/office/drawing/2014/main" val="10006"/>
+                  </a:ext>
+                </a:extLst>
               </a:tr>
               <a:tr h="434340">
                 <a:tc>
@@ -5835,6 +6099,11 @@
                   </a:txBody>
                   <a:tcPr/>
                 </a:tc>
+                <a:extLst>
+                  <a:ext uri="{0D108BD9-81ED-4DB2-BD59-A6C34878D82A}">
+                    <a16:rowId xmlns:a16="http://schemas.microsoft.com/office/drawing/2014/main" val="10007"/>
+                  </a:ext>
+                </a:extLst>
               </a:tr>
             </a:tbl>
           </a:graphicData>
@@ -5909,7 +6178,6 @@
               <a:rPr lang="en-US" dirty="0"/>
               <a:t>Refers to the applications that support the end user functions</a:t>
             </a:r>
-            <a:endParaRPr lang="en-US" dirty="0"/>
           </a:p>
           <a:p>
             <a:pPr lvl="1"/>
@@ -5917,7 +6185,6 @@
               <a:rPr lang="en-US" dirty="0"/>
               <a:t>Applications at this layer include FTP, SMTP and other services</a:t>
             </a:r>
-            <a:endParaRPr lang="en-US" dirty="0"/>
           </a:p>
           <a:p>
             <a:pPr lvl="1"/>
@@ -5925,7 +6192,6 @@
               <a:rPr lang="en-US" dirty="0"/>
               <a:t>Supports user applications with that authentication and authorization</a:t>
             </a:r>
-            <a:endParaRPr lang="en-US" dirty="0"/>
           </a:p>
           <a:p>
             <a:r>
@@ -5940,7 +6206,6 @@
               <a:rPr lang="en-US" dirty="0"/>
               <a:t> is unauthorized access to control systems</a:t>
             </a:r>
-            <a:endParaRPr lang="en-US" dirty="0"/>
           </a:p>
           <a:p>
             <a:pPr lvl="1"/>
@@ -5956,7 +6221,6 @@
               <a:rPr lang="en-US" dirty="0"/>
               <a:t>, creating backdoors for future attacks</a:t>
             </a:r>
-            <a:endParaRPr lang="en-US" dirty="0"/>
           </a:p>
           <a:p>
             <a:pPr lvl="1"/>
@@ -5964,14 +6228,12 @@
               <a:rPr lang="en-US" dirty="0"/>
               <a:t>Common attack vector using social engineering, phishing and other deceptive exploits</a:t>
             </a:r>
-            <a:endParaRPr lang="en-US" dirty="0"/>
           </a:p>
           <a:p>
             <a:r>
               <a:rPr lang="en-US" dirty="0"/>
               <a:t>First line of defense is strong organizational procedures and policies on issuing, revoking and changing authentication credentials</a:t>
             </a:r>
-            <a:endParaRPr lang="en-US" dirty="0"/>
           </a:p>
           <a:p>
             <a:endParaRPr lang="en-CA" dirty="0"/>
@@ -6024,6 +6286,7 @@
             </a:pPr>
             <a:fld id="{77EF9825-4C23-4085-A4E3-B5565466BD91}" type="slidenum">
               <a:rPr lang="en-US" smtClean="0"/>
+              <a:t>16</a:t>
             </a:fld>
             <a:endParaRPr lang="en-US" dirty="0"/>
           </a:p>
@@ -6102,7 +6365,6 @@
               <a:rPr lang="en-US" dirty="0"/>
               <a:t>/Password is common authentication</a:t>
             </a:r>
-            <a:endParaRPr lang="en-US" dirty="0"/>
           </a:p>
           <a:p>
             <a:pPr lvl="1"/>
@@ -6110,7 +6372,6 @@
               <a:rPr lang="en-US" dirty="0"/>
               <a:t>Often implemented with weak account policy</a:t>
             </a:r>
-            <a:endParaRPr lang="en-US" dirty="0"/>
           </a:p>
           <a:p>
             <a:pPr lvl="1"/>
@@ -6118,7 +6379,6 @@
               <a:rPr lang="en-US" dirty="0"/>
               <a:t>Users suffer from password fatigue</a:t>
             </a:r>
-            <a:endParaRPr lang="en-US" dirty="0"/>
           </a:p>
           <a:p>
             <a:pPr lvl="2"/>
@@ -6126,7 +6386,6 @@
               <a:rPr lang="en-US" dirty="0"/>
               <a:t>Tend to use the same password across accounts</a:t>
             </a:r>
-            <a:endParaRPr lang="en-US" dirty="0"/>
           </a:p>
           <a:p>
             <a:pPr lvl="2"/>
@@ -6134,7 +6393,6 @@
               <a:rPr lang="en-US" dirty="0"/>
               <a:t>Tend to use short easy to guess passwords</a:t>
             </a:r>
-            <a:endParaRPr lang="en-US" dirty="0"/>
           </a:p>
           <a:p>
             <a:pPr lvl="2"/>
@@ -6142,14 +6400,12 @@
               <a:rPr lang="en-US" dirty="0"/>
               <a:t>Tend to not change their passwords</a:t>
             </a:r>
-            <a:endParaRPr lang="en-US" dirty="0"/>
           </a:p>
           <a:p>
             <a:r>
               <a:rPr lang="en-US" dirty="0"/>
               <a:t>Mitigations</a:t>
             </a:r>
-            <a:endParaRPr lang="en-US" dirty="0"/>
           </a:p>
           <a:p>
             <a:pPr lvl="1"/>
@@ -6157,7 +6413,6 @@
               <a:rPr lang="en-US" dirty="0"/>
               <a:t>Password policy requiring strong passwords and regular rotations</a:t>
             </a:r>
-            <a:endParaRPr lang="en-US" dirty="0"/>
           </a:p>
           <a:p>
             <a:pPr lvl="1"/>
@@ -6165,7 +6420,6 @@
               <a:rPr lang="en-US" dirty="0"/>
               <a:t>Use generated tokens instead of passwords</a:t>
             </a:r>
-            <a:endParaRPr lang="en-US" dirty="0"/>
           </a:p>
           <a:p>
             <a:pPr lvl="2"/>
@@ -6173,7 +6427,6 @@
               <a:rPr lang="en-US" dirty="0"/>
               <a:t>These have higher entropy and are harder to crack</a:t>
             </a:r>
-            <a:endParaRPr lang="en-US" dirty="0"/>
           </a:p>
           <a:p>
             <a:pPr lvl="2"/>
@@ -6181,7 +6434,6 @@
               <a:rPr lang="en-US" dirty="0"/>
               <a:t>Eliminates the problem of password reuse</a:t>
             </a:r>
-            <a:endParaRPr lang="en-US" dirty="0"/>
           </a:p>
           <a:p>
             <a:pPr lvl="1"/>
@@ -6189,7 +6441,6 @@
               <a:rPr lang="en-US" dirty="0"/>
               <a:t>MFA – multi-factor authentication</a:t>
             </a:r>
-            <a:endParaRPr lang="en-US" dirty="0"/>
           </a:p>
           <a:p>
             <a:pPr lvl="2"/>
@@ -6197,7 +6448,6 @@
               <a:rPr lang="en-US" dirty="0"/>
               <a:t>Requires authentication from two of three possible sources</a:t>
             </a:r>
-            <a:endParaRPr lang="en-US" dirty="0"/>
           </a:p>
           <a:p>
             <a:pPr lvl="3"/>
@@ -6205,7 +6455,6 @@
               <a:rPr lang="en-US" dirty="0"/>
               <a:t>What the user knows – password or token</a:t>
             </a:r>
-            <a:endParaRPr lang="en-US" dirty="0"/>
           </a:p>
           <a:p>
             <a:pPr lvl="3"/>
@@ -6213,7 +6462,6 @@
               <a:rPr lang="en-US" dirty="0"/>
               <a:t>Where the user is – specific IP address</a:t>
             </a:r>
-            <a:endParaRPr lang="en-US" dirty="0"/>
           </a:p>
           <a:p>
             <a:pPr lvl="3"/>
@@ -6221,7 +6469,6 @@
               <a:rPr lang="en-US" dirty="0"/>
               <a:t>Something the user has – mobile phone for a confirmation code</a:t>
             </a:r>
-            <a:endParaRPr lang="en-US" dirty="0"/>
           </a:p>
           <a:p>
             <a:pPr lvl="2"/>
@@ -6282,6 +6529,7 @@
             </a:pPr>
             <a:fld id="{77EF9825-4C23-4085-A4E3-B5565466BD91}" type="slidenum">
               <a:rPr lang="en-US" smtClean="0"/>
+              <a:t>17</a:t>
             </a:fld>
             <a:endParaRPr lang="en-US" dirty="0"/>
           </a:p>
@@ -6356,14 +6604,12 @@
               <a:rPr lang="en-US" dirty="0"/>
               <a:t>Encryption is performed at this layer</a:t>
             </a:r>
-            <a:endParaRPr lang="en-US" dirty="0"/>
           </a:p>
           <a:p>
             <a:r>
               <a:rPr lang="en-US" dirty="0"/>
               <a:t>Common attacks often involve weak or missing encryption</a:t>
             </a:r>
-            <a:endParaRPr lang="en-US" dirty="0"/>
           </a:p>
           <a:p>
             <a:pPr lvl="1"/>
@@ -6371,14 +6617,12 @@
               <a:rPr lang="en-US" dirty="0"/>
               <a:t>There must be both encryption for data in transit and encryption for data at rest</a:t>
             </a:r>
-            <a:endParaRPr lang="en-US" dirty="0"/>
           </a:p>
           <a:p>
             <a:r>
               <a:rPr lang="en-US" dirty="0"/>
               <a:t>Exploitable weaknesses can occur when:</a:t>
             </a:r>
-            <a:endParaRPr lang="en-US" dirty="0"/>
           </a:p>
           <a:p>
             <a:pPr lvl="1"/>
@@ -6386,7 +6630,6 @@
               <a:rPr lang="en-US" dirty="0"/>
               <a:t>An encryption standard is used that is too weak, one that has known weaknesses for example</a:t>
             </a:r>
-            <a:endParaRPr lang="en-US" dirty="0"/>
           </a:p>
           <a:p>
             <a:pPr lvl="1"/>
@@ -6394,7 +6637,6 @@
               <a:rPr lang="en-US" dirty="0"/>
               <a:t>Flawed implementation of the encryption such as:</a:t>
             </a:r>
-            <a:endParaRPr lang="en-US" dirty="0"/>
           </a:p>
           <a:p>
             <a:pPr lvl="2"/>
@@ -6402,7 +6644,6 @@
               <a:rPr lang="en-US" dirty="0"/>
               <a:t>Keys are too short</a:t>
             </a:r>
-            <a:endParaRPr lang="en-US" dirty="0"/>
           </a:p>
           <a:p>
             <a:pPr lvl="2"/>
@@ -6410,7 +6651,6 @@
               <a:rPr lang="en-US" dirty="0"/>
               <a:t>Salts are not used in digests allowing the use of rainbow tables to reverse engineer passwords</a:t>
             </a:r>
-            <a:endParaRPr lang="en-US" dirty="0"/>
           </a:p>
           <a:p>
             <a:pPr lvl="2"/>
@@ -6418,7 +6658,6 @@
               <a:rPr lang="en-US" dirty="0"/>
               <a:t>Using an encryption library that has not been fully vetted</a:t>
             </a:r>
-            <a:endParaRPr lang="en-US" dirty="0"/>
           </a:p>
           <a:p>
             <a:pPr lvl="2"/>
@@ -6426,7 +6665,6 @@
               <a:rPr lang="en-US" dirty="0"/>
               <a:t>Using a home-grown encryption library that is not full tested</a:t>
             </a:r>
-            <a:endParaRPr lang="en-US" dirty="0"/>
           </a:p>
           <a:p>
             <a:pPr lvl="1"/>
@@ -6434,7 +6672,6 @@
               <a:rPr lang="en-US" dirty="0"/>
               <a:t>Flawed application of an encryption application</a:t>
             </a:r>
-            <a:endParaRPr lang="en-US" dirty="0"/>
           </a:p>
           <a:p>
             <a:pPr lvl="2"/>
@@ -6442,7 +6679,6 @@
               <a:rPr lang="en-US" dirty="0"/>
               <a:t>Failure to encrypt data when it should be</a:t>
             </a:r>
-            <a:endParaRPr lang="en-US" dirty="0"/>
           </a:p>
           <a:p>
             <a:pPr lvl="2"/>
@@ -6450,7 +6686,6 @@
               <a:rPr lang="en-US" dirty="0"/>
               <a:t>Not encrypting some data that is accessible</a:t>
             </a:r>
-            <a:endParaRPr lang="en-US" dirty="0"/>
           </a:p>
           <a:p>
             <a:pPr lvl="2"/>
@@ -6511,6 +6746,7 @@
             </a:pPr>
             <a:fld id="{77EF9825-4C23-4085-A4E3-B5565466BD91}" type="slidenum">
               <a:rPr lang="en-US" smtClean="0"/>
+              <a:t>18</a:t>
             </a:fld>
             <a:endParaRPr lang="en-US" dirty="0"/>
           </a:p>
@@ -6585,7 +6821,6 @@
               <a:rPr lang="en-US" dirty="0"/>
               <a:t>Presentation level security can be subverted at the application level</a:t>
             </a:r>
-            <a:endParaRPr lang="en-US" dirty="0"/>
           </a:p>
           <a:p>
             <a:r>
@@ -6600,7 +6835,6 @@
               <a:rPr lang="en-US" dirty="0"/>
               <a:t>) attack</a:t>
             </a:r>
-            <a:endParaRPr lang="en-US" dirty="0"/>
           </a:p>
           <a:p>
             <a:pPr lvl="1"/>
@@ -6608,14 +6842,12 @@
               <a:rPr lang="en-US" dirty="0"/>
               <a:t>Access is gained at the application level to steal or alter data before it become encrypted</a:t>
             </a:r>
-            <a:endParaRPr lang="en-US" dirty="0"/>
           </a:p>
           <a:p>
             <a:r>
               <a:rPr lang="en-US" dirty="0"/>
               <a:t>Often the result of human engineering</a:t>
             </a:r>
-            <a:endParaRPr lang="en-US" dirty="0"/>
           </a:p>
           <a:p>
             <a:pPr lvl="1"/>
@@ -6623,7 +6855,6 @@
               <a:rPr lang="en-US" dirty="0"/>
               <a:t>Compromised user installs malware</a:t>
             </a:r>
-            <a:endParaRPr lang="en-US" dirty="0"/>
           </a:p>
           <a:p>
             <a:pPr lvl="1"/>
@@ -6631,14 +6862,12 @@
               <a:rPr lang="en-US" dirty="0"/>
               <a:t>Or malware is installed from a phishing or other attack</a:t>
             </a:r>
-            <a:endParaRPr lang="en-US" dirty="0"/>
           </a:p>
           <a:p>
             <a:r>
               <a:rPr lang="en-US" dirty="0"/>
               <a:t>Can be mitigated to a degree by isolation</a:t>
             </a:r>
-            <a:endParaRPr lang="en-US" dirty="0"/>
           </a:p>
           <a:p>
             <a:pPr lvl="1"/>
@@ -6646,7 +6875,6 @@
               <a:rPr lang="en-US" dirty="0"/>
               <a:t>Applications used for systems control do not have access to other applications</a:t>
             </a:r>
-            <a:endParaRPr lang="en-US" dirty="0"/>
           </a:p>
           <a:p>
             <a:pPr lvl="1"/>
@@ -6654,7 +6882,6 @@
               <a:rPr lang="en-US" dirty="0"/>
               <a:t>No public access to the user control apps</a:t>
             </a:r>
-            <a:endParaRPr lang="en-US" dirty="0"/>
           </a:p>
           <a:p>
             <a:pPr lvl="1"/>
@@ -6662,14 +6889,12 @@
               <a:rPr lang="en-US" dirty="0"/>
               <a:t>Only the absolute minimum network access to private networks</a:t>
             </a:r>
-            <a:endParaRPr lang="en-US" dirty="0"/>
           </a:p>
           <a:p>
             <a:r>
               <a:rPr lang="en-US" dirty="0"/>
               <a:t>Ideally, control systems only connect to the system they control</a:t>
             </a:r>
-            <a:endParaRPr lang="en-US" dirty="0"/>
           </a:p>
           <a:p>
             <a:pPr lvl="2"/>
@@ -6730,6 +6955,7 @@
             </a:pPr>
             <a:fld id="{77EF9825-4C23-4085-A4E3-B5565466BD91}" type="slidenum">
               <a:rPr lang="en-US" smtClean="0"/>
+              <a:t>19</a:t>
             </a:fld>
             <a:endParaRPr lang="en-US" dirty="0"/>
           </a:p>
@@ -6862,6 +7088,7 @@
             </a:pPr>
             <a:fld id="{77EF9825-4C23-4085-A4E3-B5565466BD91}" type="slidenum">
               <a:rPr lang="en-US" smtClean="0"/>
+              <a:t>2</a:t>
             </a:fld>
             <a:endParaRPr lang="en-US" dirty="0"/>
           </a:p>
@@ -6937,7 +7164,6 @@
               <a:rPr lang="en-US" dirty="0"/>
               <a:t>Copyright © 2021 Elephant Scale. All rights reserved.</a:t>
             </a:r>
-            <a:endParaRPr lang="en-US" dirty="0"/>
           </a:p>
         </p:txBody>
       </p:sp>
@@ -6961,6 +7187,7 @@
             </a:pPr>
             <a:fld id="{77EF9825-4C23-4085-A4E3-B5565466BD91}" type="slidenum">
               <a:rPr lang="en-US" smtClean="0"/>
+              <a:t>20</a:t>
             </a:fld>
             <a:endParaRPr lang="en-US" dirty="0"/>
           </a:p>
@@ -6975,7 +7202,7 @@
           <p:nvPr/>
         </p:nvPicPr>
         <p:blipFill>
-          <a:blip r:embed="rId1"/>
+          <a:blip r:embed="rId2"/>
           <a:stretch>
             <a:fillRect/>
           </a:stretch>
@@ -7059,7 +7286,6 @@
               <a:rPr lang="en-US" dirty="0"/>
               <a:t>The main attacks at this level deal with interfering with sessions or some sort of session hijack</a:t>
             </a:r>
-            <a:endParaRPr lang="en-US" dirty="0"/>
           </a:p>
           <a:p>
             <a:r>
@@ -7074,21 +7300,18 @@
               <a:rPr lang="en-US" dirty="0"/>
               <a:t>) attacks occur when an adversary can intercept communications between two parties in a session</a:t>
             </a:r>
-            <a:endParaRPr lang="en-US" dirty="0"/>
           </a:p>
           <a:p>
             <a:r>
               <a:rPr lang="en-US" dirty="0"/>
               <a:t>A main risk is that an adversary could take over an automated system by hijacking a session between the system and an operator</a:t>
             </a:r>
-            <a:endParaRPr lang="en-US" dirty="0"/>
           </a:p>
           <a:p>
             <a:r>
               <a:rPr lang="en-US" dirty="0"/>
               <a:t>Some potential exploits</a:t>
             </a:r>
-            <a:endParaRPr lang="en-US" dirty="0"/>
           </a:p>
           <a:p>
             <a:pPr lvl="1"/>
@@ -7096,7 +7319,6 @@
               <a:rPr lang="en-US" dirty="0"/>
               <a:t>Failure to use regular confirmation of identity of participant</a:t>
             </a:r>
-            <a:endParaRPr lang="en-US" dirty="0"/>
           </a:p>
           <a:p>
             <a:pPr lvl="2"/>
@@ -7104,7 +7326,6 @@
               <a:rPr lang="en-US" dirty="0"/>
               <a:t>Ignoring warning about expired TSL certificate for example</a:t>
             </a:r>
-            <a:endParaRPr lang="en-US" dirty="0"/>
           </a:p>
           <a:p>
             <a:pPr lvl="1"/>
@@ -7112,7 +7333,6 @@
               <a:rPr lang="en-US" dirty="0"/>
               <a:t>Failure to rotate credentials during a session</a:t>
             </a:r>
-            <a:endParaRPr lang="en-US" dirty="0"/>
           </a:p>
           <a:p>
             <a:pPr lvl="2"/>
@@ -7120,7 +7340,6 @@
               <a:rPr lang="en-US" dirty="0"/>
               <a:t>The longer a set of credentials is used, the more likely they are to be hacked</a:t>
             </a:r>
-            <a:endParaRPr lang="en-US" dirty="0"/>
           </a:p>
           <a:p>
             <a:pPr lvl="1"/>
@@ -7128,7 +7347,6 @@
               <a:rPr lang="en-US" dirty="0"/>
               <a:t>Failure to securely transmit session information</a:t>
             </a:r>
-            <a:endParaRPr lang="en-US" dirty="0"/>
           </a:p>
           <a:p>
             <a:pPr lvl="2"/>
@@ -7136,7 +7354,6 @@
               <a:rPr lang="en-US" dirty="0"/>
               <a:t>Often makes the session tokens or ids guessable by an adversary</a:t>
             </a:r>
-            <a:endParaRPr lang="en-US" dirty="0"/>
           </a:p>
           <a:p>
             <a:pPr lvl="1"/>
@@ -7201,6 +7418,7 @@
             </a:pPr>
             <a:fld id="{77EF9825-4C23-4085-A4E3-B5565466BD91}" type="slidenum">
               <a:rPr lang="en-US" smtClean="0"/>
+              <a:t>21</a:t>
             </a:fld>
             <a:endParaRPr lang="en-US" dirty="0"/>
           </a:p>
@@ -7275,7 +7493,6 @@
               <a:rPr lang="en-US" dirty="0"/>
               <a:t>Internet based attacks probe for open ports</a:t>
             </a:r>
-            <a:endParaRPr lang="en-US" dirty="0"/>
           </a:p>
           <a:p>
             <a:pPr lvl="1"/>
@@ -7283,7 +7500,6 @@
               <a:rPr lang="en-US" dirty="0"/>
               <a:t>Can be used to inject malware</a:t>
             </a:r>
-            <a:endParaRPr lang="en-US" dirty="0"/>
           </a:p>
           <a:p>
             <a:pPr lvl="1"/>
@@ -7291,14 +7507,12 @@
               <a:rPr lang="en-US" dirty="0"/>
               <a:t>Malware often opens other ports as a backdoor</a:t>
             </a:r>
-            <a:endParaRPr lang="en-US" dirty="0"/>
           </a:p>
           <a:p>
             <a:r>
               <a:rPr lang="en-US" dirty="0"/>
               <a:t>Mitigations involve</a:t>
             </a:r>
-            <a:endParaRPr lang="en-US" dirty="0"/>
           </a:p>
           <a:p>
             <a:pPr lvl="1"/>
@@ -7306,7 +7520,6 @@
               <a:rPr lang="en-US" dirty="0"/>
               <a:t>Regular port scans</a:t>
             </a:r>
-            <a:endParaRPr lang="en-US" dirty="0"/>
           </a:p>
           <a:p>
             <a:pPr lvl="1"/>
@@ -7314,7 +7527,6 @@
               <a:rPr lang="en-US" dirty="0"/>
               <a:t>Use of non-standard ports to confound probing for commonly used ports</a:t>
             </a:r>
-            <a:endParaRPr lang="en-US" dirty="0"/>
           </a:p>
           <a:p>
             <a:pPr lvl="1"/>
@@ -7322,21 +7534,18 @@
               <a:rPr lang="en-US" dirty="0"/>
               <a:t>Firewalls to block access to most ports except those explicitly allowed on a whitelist</a:t>
             </a:r>
-            <a:endParaRPr lang="en-US" dirty="0"/>
           </a:p>
           <a:p>
             <a:r>
               <a:rPr lang="en-US" dirty="0"/>
               <a:t>Known or published IP addresses are potential targets</a:t>
             </a:r>
-            <a:endParaRPr lang="en-US" dirty="0"/>
           </a:p>
           <a:p>
             <a:r>
               <a:rPr lang="en-US" dirty="0"/>
               <a:t>Mitigations involve</a:t>
             </a:r>
-            <a:endParaRPr lang="en-US" dirty="0"/>
           </a:p>
           <a:p>
             <a:pPr lvl="1"/>
@@ -7344,7 +7553,6 @@
               <a:rPr lang="en-US" dirty="0"/>
               <a:t>Use of an API gateway to map external IP addresses to internal addresses</a:t>
             </a:r>
-            <a:endParaRPr lang="en-US" dirty="0"/>
           </a:p>
           <a:p>
             <a:pPr lvl="1"/>
@@ -7352,7 +7560,6 @@
               <a:rPr lang="en-US" dirty="0"/>
               <a:t>Use of filtering and firewalling on the gateway</a:t>
             </a:r>
-            <a:endParaRPr lang="en-US" dirty="0"/>
           </a:p>
           <a:p>
             <a:pPr lvl="1"/>
@@ -7360,7 +7567,6 @@
               <a:rPr lang="en-US" dirty="0"/>
               <a:t>Establishment of a DNZ</a:t>
             </a:r>
-            <a:endParaRPr lang="en-US" dirty="0"/>
           </a:p>
           <a:p>
             <a:pPr lvl="1"/>
@@ -7414,6 +7620,7 @@
             </a:pPr>
             <a:fld id="{77EF9825-4C23-4085-A4E3-B5565466BD91}" type="slidenum">
               <a:rPr lang="en-US" smtClean="0"/>
+              <a:t>22</a:t>
             </a:fld>
             <a:endParaRPr lang="en-US" dirty="0"/>
           </a:p>
@@ -7494,7 +7701,6 @@
               <a:rPr lang="en-US" dirty="0"/>
               <a:t>DMZs connect internal networks to the outside world</a:t>
             </a:r>
-            <a:endParaRPr lang="en-US" dirty="0"/>
           </a:p>
           <a:p>
             <a:pPr lvl="2"/>
@@ -7502,7 +7708,6 @@
               <a:rPr lang="en-US" dirty="0"/>
               <a:t>Internal networks cannot be accessed directly</a:t>
             </a:r>
-            <a:endParaRPr lang="en-US" dirty="0"/>
           </a:p>
           <a:p>
             <a:pPr lvl="2"/>
@@ -7510,7 +7715,6 @@
               <a:rPr lang="en-US" dirty="0"/>
               <a:t>Must go through the DMZ</a:t>
             </a:r>
-            <a:endParaRPr lang="en-US" dirty="0"/>
           </a:p>
           <a:p>
             <a:pPr lvl="2"/>
@@ -7518,7 +7722,6 @@
               <a:rPr lang="en-US" dirty="0"/>
               <a:t>Including standard application-level attacks</a:t>
             </a:r>
-            <a:endParaRPr lang="en-US" dirty="0"/>
           </a:p>
           <a:p>
             <a:pPr lvl="1"/>
@@ -7526,7 +7729,6 @@
               <a:rPr lang="en-US" dirty="0"/>
               <a:t>Honeypots are fake networks</a:t>
             </a:r>
-            <a:endParaRPr lang="en-US" dirty="0"/>
           </a:p>
           <a:p>
             <a:pPr lvl="2"/>
@@ -7534,7 +7736,6 @@
               <a:rPr lang="en-US" dirty="0"/>
               <a:t>Designed to distract attackers</a:t>
             </a:r>
-            <a:endParaRPr lang="en-US" dirty="0"/>
           </a:p>
           <a:p>
             <a:pPr lvl="2"/>
@@ -7542,7 +7743,6 @@
               <a:rPr lang="en-US" dirty="0"/>
               <a:t>They wind up attacking the honeypot instead of the industrial system</a:t>
             </a:r>
-            <a:endParaRPr lang="en-US" dirty="0"/>
           </a:p>
         </p:txBody>
       </p:sp>
@@ -7592,6 +7792,7 @@
             </a:pPr>
             <a:fld id="{77EF9825-4C23-4085-A4E3-B5565466BD91}" type="slidenum">
               <a:rPr lang="en-US" smtClean="0"/>
+              <a:t>23</a:t>
             </a:fld>
             <a:endParaRPr lang="en-US" dirty="0"/>
           </a:p>
@@ -7606,7 +7807,7 @@
           <p:nvPr/>
         </p:nvPicPr>
         <p:blipFill>
-          <a:blip r:embed="rId1"/>
+          <a:blip r:embed="rId3"/>
           <a:stretch>
             <a:fillRect/>
           </a:stretch>
@@ -7688,7 +7889,6 @@
               <a:rPr lang="en-US" dirty="0"/>
               <a:t>Level at which most network hardware operates</a:t>
             </a:r>
-            <a:endParaRPr lang="en-US" dirty="0"/>
           </a:p>
           <a:p>
             <a:pPr lvl="1"/>
@@ -7696,14 +7896,12 @@
               <a:rPr lang="en-US" dirty="0"/>
               <a:t>Switches, routers, firewalls, etc.</a:t>
             </a:r>
-            <a:endParaRPr lang="en-US" dirty="0"/>
           </a:p>
           <a:p>
             <a:r>
               <a:rPr lang="en-US" dirty="0"/>
               <a:t>Attacker can reroute traffic via a compromised router</a:t>
             </a:r>
-            <a:endParaRPr lang="en-US" dirty="0"/>
           </a:p>
           <a:p>
             <a:pPr lvl="1"/>
@@ -7711,14 +7909,12 @@
               <a:rPr lang="en-US" dirty="0"/>
               <a:t>Many commercial routers have security flaws</a:t>
             </a:r>
-            <a:endParaRPr lang="en-US" dirty="0"/>
           </a:p>
           <a:p>
             <a:r>
               <a:rPr lang="en-US" dirty="0"/>
               <a:t>Malware insertion into network devices is a common attack</a:t>
             </a:r>
-            <a:endParaRPr lang="en-US" dirty="0"/>
           </a:p>
           <a:p>
             <a:pPr lvl="1"/>
@@ -7726,7 +7922,6 @@
               <a:rPr lang="en-US" dirty="0"/>
               <a:t>Used by the NSA as part of their Tailored Access Operations (TAO)</a:t>
             </a:r>
-            <a:endParaRPr lang="en-US" dirty="0"/>
           </a:p>
           <a:p>
             <a:pPr lvl="1"/>
@@ -7734,7 +7929,6 @@
               <a:rPr lang="en-US" dirty="0"/>
               <a:t>Network devices are physically intercepted during shipment</a:t>
             </a:r>
-            <a:endParaRPr lang="en-US" dirty="0"/>
           </a:p>
           <a:p>
             <a:pPr lvl="1"/>
@@ -7742,14 +7936,12 @@
               <a:rPr lang="en-US" dirty="0"/>
               <a:t>Malware is installed to create backdoors</a:t>
             </a:r>
-            <a:endParaRPr lang="en-US" dirty="0"/>
           </a:p>
           <a:p>
             <a:r>
               <a:rPr lang="en-US" dirty="0"/>
               <a:t>Security analyses often overlook off the shelf hardware</a:t>
             </a:r>
-            <a:endParaRPr lang="en-US" dirty="0"/>
           </a:p>
         </p:txBody>
       </p:sp>
@@ -7799,6 +7991,7 @@
             </a:pPr>
             <a:fld id="{77EF9825-4C23-4085-A4E3-B5565466BD91}" type="slidenum">
               <a:rPr lang="en-US" smtClean="0"/>
+              <a:t>24</a:t>
             </a:fld>
             <a:endParaRPr lang="en-US" dirty="0"/>
           </a:p>
@@ -7898,6 +8091,7 @@
             </a:pPr>
             <a:fld id="{77EF9825-4C23-4085-A4E3-B5565466BD91}" type="slidenum">
               <a:rPr lang="en-US" smtClean="0"/>
+              <a:t>25</a:t>
             </a:fld>
             <a:endParaRPr lang="en-US" dirty="0"/>
           </a:p>
@@ -7912,7 +8106,7 @@
           <p:nvPr/>
         </p:nvPicPr>
         <p:blipFill>
-          <a:blip r:embed="rId1"/>
+          <a:blip r:embed="rId3"/>
           <a:stretch>
             <a:fillRect/>
           </a:stretch>
@@ -7994,7 +8188,6 @@
               <a:rPr lang="en-US" dirty="0"/>
               <a:t>Mitigations involve</a:t>
             </a:r>
-            <a:endParaRPr lang="en-US" dirty="0"/>
           </a:p>
           <a:p>
             <a:pPr lvl="1"/>
@@ -8002,7 +8195,6 @@
               <a:rPr lang="en-US" dirty="0"/>
               <a:t>Using NAT and other address translation strategies</a:t>
             </a:r>
-            <a:endParaRPr lang="en-US" dirty="0"/>
           </a:p>
           <a:p>
             <a:pPr lvl="1"/>
@@ -8010,7 +8202,6 @@
               <a:rPr lang="en-US" dirty="0"/>
               <a:t>Physically secure network equipment</a:t>
             </a:r>
-            <a:endParaRPr lang="en-US" dirty="0"/>
           </a:p>
           <a:p>
             <a:pPr lvl="1"/>
@@ -8018,7 +8209,6 @@
               <a:rPr lang="en-US" dirty="0"/>
               <a:t>Breeches at this layer commonly occur inside the organization</a:t>
             </a:r>
-            <a:endParaRPr lang="en-US" dirty="0"/>
           </a:p>
           <a:p>
             <a:pPr lvl="1"/>
@@ -8026,7 +8216,6 @@
               <a:rPr lang="en-US" dirty="0"/>
               <a:t>The use of VPNs where possible</a:t>
             </a:r>
-            <a:endParaRPr lang="en-US" dirty="0"/>
           </a:p>
           <a:p>
             <a:pPr lvl="1"/>
@@ -8034,7 +8223,6 @@
               <a:rPr lang="en-US" dirty="0"/>
               <a:t>However, this does add a layer of latency and complexity</a:t>
             </a:r>
-            <a:endParaRPr lang="en-US" dirty="0"/>
           </a:p>
           <a:p>
             <a:pPr lvl="1"/>
@@ -8042,7 +8230,6 @@
               <a:rPr lang="en-US" dirty="0"/>
               <a:t>Full security audits of all network equipment</a:t>
             </a:r>
-            <a:endParaRPr lang="en-US" dirty="0"/>
           </a:p>
         </p:txBody>
       </p:sp>
@@ -8092,6 +8279,7 @@
             </a:pPr>
             <a:fld id="{77EF9825-4C23-4085-A4E3-B5565466BD91}" type="slidenum">
               <a:rPr lang="en-US" smtClean="0"/>
+              <a:t>26</a:t>
             </a:fld>
             <a:endParaRPr lang="en-US" dirty="0"/>
           </a:p>
@@ -8164,14 +8352,12 @@
               <a:rPr lang="en-US" dirty="0"/>
               <a:t>This layer works on the MAC address and packet layer</a:t>
             </a:r>
-            <a:endParaRPr lang="en-US" dirty="0"/>
           </a:p>
           <a:p>
             <a:r>
               <a:rPr lang="en-US" dirty="0"/>
               <a:t>Common attack is to force a Network Interface Controller (NIC) into promiscuous mode</a:t>
             </a:r>
-            <a:endParaRPr lang="en-US" dirty="0"/>
           </a:p>
           <a:p>
             <a:pPr lvl="1"/>
@@ -8179,21 +8365,18 @@
               <a:rPr lang="en-US" dirty="0"/>
               <a:t>This allows it to absorb traffic intended for other machines</a:t>
             </a:r>
-            <a:endParaRPr lang="en-US" dirty="0"/>
           </a:p>
           <a:p>
             <a:r>
               <a:rPr lang="en-US" dirty="0"/>
               <a:t>This is also the layer where attackers may spoof a MAC address</a:t>
             </a:r>
-            <a:endParaRPr lang="en-US" dirty="0"/>
           </a:p>
           <a:p>
             <a:r>
               <a:rPr lang="en-US" dirty="0"/>
               <a:t>Mitigation</a:t>
             </a:r>
-            <a:endParaRPr lang="en-US" dirty="0"/>
           </a:p>
           <a:p>
             <a:pPr lvl="1"/>
@@ -8201,7 +8384,6 @@
               <a:rPr lang="en-US" dirty="0"/>
               <a:t>A common mitigation is to create separate virtual LANS (VLANs) on a single physical LAN</a:t>
             </a:r>
-            <a:endParaRPr lang="en-US" dirty="0"/>
           </a:p>
           <a:p>
             <a:pPr lvl="1"/>
@@ -8209,7 +8391,6 @@
               <a:rPr lang="en-US" dirty="0"/>
               <a:t>Access control lists can then be applied to the different VLANs</a:t>
             </a:r>
-            <a:endParaRPr lang="en-US" dirty="0"/>
           </a:p>
           <a:p>
             <a:pPr lvl="1"/>
@@ -8217,7 +8398,6 @@
               <a:rPr lang="en-US" dirty="0"/>
               <a:t>Disabling unused ports also helps at this layer too</a:t>
             </a:r>
-            <a:endParaRPr lang="en-US" dirty="0"/>
           </a:p>
         </p:txBody>
       </p:sp>
@@ -8267,6 +8447,7 @@
             </a:pPr>
             <a:fld id="{77EF9825-4C23-4085-A4E3-B5565466BD91}" type="slidenum">
               <a:rPr lang="en-US" smtClean="0"/>
+              <a:t>27</a:t>
             </a:fld>
             <a:endParaRPr lang="en-US" dirty="0"/>
           </a:p>
@@ -8339,7 +8520,6 @@
               <a:rPr lang="en-US" dirty="0"/>
               <a:t>Most common attack is compromised physical devices</a:t>
             </a:r>
-            <a:endParaRPr lang="en-US" dirty="0"/>
           </a:p>
           <a:p>
             <a:pPr lvl="1"/>
@@ -8347,14 +8527,12 @@
               <a:rPr lang="en-US" dirty="0"/>
               <a:t>Access to the devices creates opportunities for insertion of malware or physical taps or attacks</a:t>
             </a:r>
-            <a:endParaRPr lang="en-US" dirty="0"/>
           </a:p>
           <a:p>
             <a:r>
               <a:rPr lang="en-US" dirty="0"/>
               <a:t>First line of defense</a:t>
             </a:r>
-            <a:endParaRPr lang="en-US" dirty="0"/>
           </a:p>
           <a:p>
             <a:pPr lvl="1"/>
@@ -8362,7 +8540,6 @@
               <a:rPr lang="en-US" dirty="0"/>
               <a:t>Physically isolate and lock up all the equipment</a:t>
             </a:r>
-            <a:endParaRPr lang="en-US" dirty="0"/>
           </a:p>
           <a:p>
             <a:pPr lvl="1"/>
@@ -8370,7 +8547,6 @@
               <a:rPr lang="en-US" dirty="0"/>
               <a:t>Allow access only to vetted people who need access</a:t>
             </a:r>
-            <a:endParaRPr lang="en-US" dirty="0"/>
           </a:p>
           <a:p>
             <a:pPr lvl="1"/>
@@ -8378,14 +8554,12 @@
               <a:rPr lang="en-US" dirty="0"/>
               <a:t>Use the lowest level of access needed</a:t>
             </a:r>
-            <a:endParaRPr lang="en-US" dirty="0"/>
           </a:p>
           <a:p>
             <a:r>
               <a:rPr lang="en-US" dirty="0"/>
               <a:t>Social engineering attacks try to convince staff to allow access to bad actors</a:t>
             </a:r>
-            <a:endParaRPr lang="en-US" dirty="0"/>
           </a:p>
           <a:p>
             <a:pPr lvl="1"/>
@@ -8393,7 +8567,6 @@
               <a:rPr lang="en-US" dirty="0"/>
               <a:t>Mitigation is to have strongly enforced security measures</a:t>
             </a:r>
-            <a:endParaRPr lang="en-US" dirty="0"/>
           </a:p>
           <a:p>
             <a:pPr lvl="1"/>
@@ -8401,14 +8574,12 @@
               <a:rPr lang="en-US" dirty="0"/>
               <a:t>“We will not open the server room for anyone who claims to have lost their keycard.”</a:t>
             </a:r>
-            <a:endParaRPr lang="en-US" dirty="0"/>
           </a:p>
           <a:p>
             <a:r>
               <a:rPr lang="en-US" dirty="0"/>
               <a:t>Physical interception is done by accessing cables and other devices – data taps for example</a:t>
             </a:r>
-            <a:endParaRPr lang="en-US" dirty="0"/>
           </a:p>
           <a:p>
             <a:pPr lvl="1"/>
@@ -8416,7 +8587,6 @@
               <a:rPr lang="en-US" dirty="0"/>
               <a:t>Also done by monitoring EM signals from monitors and other devices</a:t>
             </a:r>
-            <a:endParaRPr lang="en-US" dirty="0"/>
           </a:p>
           <a:p>
             <a:pPr marL="405130" lvl="1" indent="0">
@@ -8472,6 +8642,7 @@
             </a:pPr>
             <a:fld id="{77EF9825-4C23-4085-A4E3-B5565466BD91}" type="slidenum">
               <a:rPr lang="en-US" smtClean="0"/>
+              <a:t>28</a:t>
             </a:fld>
             <a:endParaRPr lang="en-US" dirty="0"/>
           </a:p>
@@ -8544,7 +8715,6 @@
               <a:rPr lang="en-US" dirty="0"/>
               <a:t>Common vector to disable physical devices</a:t>
             </a:r>
-            <a:endParaRPr lang="en-US" dirty="0"/>
           </a:p>
           <a:p>
             <a:pPr lvl="1"/>
@@ -8552,7 +8722,6 @@
               <a:rPr lang="en-US" dirty="0"/>
               <a:t>Power overloads</a:t>
             </a:r>
-            <a:endParaRPr lang="en-US" dirty="0"/>
           </a:p>
           <a:p>
             <a:pPr lvl="1"/>
@@ -8560,14 +8729,12 @@
               <a:rPr lang="en-US" dirty="0"/>
               <a:t>EM pulses or physical damage</a:t>
             </a:r>
-            <a:endParaRPr lang="en-US" dirty="0"/>
           </a:p>
           <a:p>
             <a:r>
               <a:rPr lang="en-US" dirty="0"/>
               <a:t>Mitigations</a:t>
             </a:r>
-            <a:endParaRPr lang="en-US" dirty="0"/>
           </a:p>
           <a:p>
             <a:pPr lvl="1"/>
@@ -8575,7 +8742,6 @@
               <a:rPr lang="en-US" dirty="0"/>
               <a:t>Any device, cable or other “thing” connected to the network is vulnerable</a:t>
             </a:r>
-            <a:endParaRPr lang="en-US" dirty="0"/>
           </a:p>
           <a:p>
             <a:pPr lvl="1"/>
@@ -8583,7 +8749,6 @@
               <a:rPr lang="en-US" dirty="0"/>
               <a:t>Use proper shielding and physical isolation when necessary</a:t>
             </a:r>
-            <a:endParaRPr lang="en-US" dirty="0"/>
           </a:p>
           <a:p>
             <a:pPr lvl="1"/>
@@ -8591,7 +8756,6 @@
               <a:rPr lang="en-US" dirty="0"/>
               <a:t>Have a good disaster recover plan for loss of physical assets</a:t>
             </a:r>
-            <a:endParaRPr lang="en-US" dirty="0"/>
           </a:p>
           <a:p>
             <a:pPr marL="405130" lvl="1" indent="0">
@@ -8647,6 +8811,7 @@
             </a:pPr>
             <a:fld id="{77EF9825-4C23-4085-A4E3-B5565466BD91}" type="slidenum">
               <a:rPr lang="en-US" smtClean="0"/>
+              <a:t>29</a:t>
             </a:fld>
             <a:endParaRPr lang="en-US" dirty="0"/>
           </a:p>
@@ -8724,7 +8889,6 @@
               <a:rPr lang="en-US" dirty="0"/>
               <a:t>Open System Interconnection or OSI layers</a:t>
             </a:r>
-            <a:endParaRPr lang="en-US" dirty="0"/>
           </a:p>
           <a:p>
             <a:r>
@@ -8792,11 +8956,6 @@
               </a:rPr>
               <a:t>Copyright © 2021 by Elephant Scale, All Rights Reserved</a:t>
             </a:r>
-            <a:endParaRPr sz="800">
-              <a:solidFill>
-                <a:srgbClr val="000000"/>
-              </a:solidFill>
-            </a:endParaRPr>
           </a:p>
         </p:txBody>
       </p:sp>
@@ -8809,7 +8968,7 @@
           <p:nvPr/>
         </p:nvPicPr>
         <p:blipFill>
-          <a:blip r:embed="rId1"/>
+          <a:blip r:embed="rId3"/>
           <a:stretch>
             <a:fillRect/>
           </a:stretch>
@@ -8837,12 +8996,14 @@
         <p:spPr/>
         <p:txBody>
           <a:bodyPr/>
+          <a:lstStyle/>
           <a:p>
             <a:pPr>
               <a:defRPr/>
             </a:pPr>
             <a:fld id="{77EF9825-4C23-4085-A4E3-B5565466BD91}" type="slidenum">
               <a:rPr lang="en-US" smtClean="0"/>
+              <a:t>3</a:t>
             </a:fld>
             <a:endParaRPr lang="en-US" dirty="0"/>
           </a:p>
@@ -8861,6 +9022,7 @@
         <p:spPr/>
         <p:txBody>
           <a:bodyPr/>
+          <a:lstStyle/>
           <a:p>
             <a:pPr algn="l">
               <a:defRPr/>
@@ -8869,7 +9031,6 @@
               <a:rPr lang="en-US" dirty="0"/>
               <a:t>Copyright © 2021 Elephant Scale. All rights reserved.</a:t>
             </a:r>
-            <a:endParaRPr lang="en-US" dirty="0"/>
           </a:p>
         </p:txBody>
       </p:sp>
@@ -9000,6 +9161,7 @@
             </a:pPr>
             <a:fld id="{77EF9825-4C23-4085-A4E3-B5565466BD91}" type="slidenum">
               <a:rPr lang="en-US" smtClean="0"/>
+              <a:t>30</a:t>
             </a:fld>
             <a:endParaRPr lang="en-US" dirty="0"/>
           </a:p>
@@ -9063,7 +9225,12 @@
             <p:ph idx="1"/>
           </p:nvPr>
         </p:nvSpPr>
-        <p:spPr/>
+        <p:spPr>
+          <a:xfrm>
+            <a:off x="234950" y="994976"/>
+            <a:ext cx="8902700" cy="1782355"/>
+          </a:xfrm>
+        </p:spPr>
         <p:txBody>
           <a:bodyPr/>
           <a:lstStyle/>
@@ -9072,32 +9239,12 @@
               <a:rPr lang="en-US" dirty="0"/>
               <a:t>Any IoT security solution must include a security model and plan for each of the OSI levels or their equivalent</a:t>
             </a:r>
-            <a:endParaRPr lang="en-US" dirty="0"/>
           </a:p>
           <a:p>
             <a:r>
               <a:rPr lang="en-US" dirty="0"/>
               <a:t>Any deployed system is as insecure as the security at its weakest level</a:t>
             </a:r>
-            <a:endParaRPr lang="en-US" dirty="0"/>
-          </a:p>
-          <a:p>
-            <a:pPr marL="0" indent="0">
-              <a:buNone/>
-            </a:pPr>
-            <a:r>
-              <a:rPr lang="en-CA" dirty="0"/>
-              <a:t>&lt;&lt; diagram to be inserted OSI security </a:t>
-            </a:r>
-            <a:r>
-              <a:rPr lang="en-CA" dirty="0" err="1"/>
-              <a:t>Pyramie</a:t>
-            </a:r>
-            <a:r>
-              <a:rPr lang="en-CA" dirty="0"/>
-              <a:t>\d&gt;&gt;</a:t>
-            </a:r>
-            <a:endParaRPr lang="en-CA" dirty="0"/>
           </a:p>
         </p:txBody>
       </p:sp>
@@ -9147,11 +9294,42 @@
             </a:pPr>
             <a:fld id="{77EF9825-4C23-4085-A4E3-B5565466BD91}" type="slidenum">
               <a:rPr lang="en-US" smtClean="0"/>
+              <a:t>31</a:t>
             </a:fld>
             <a:endParaRPr lang="en-US" dirty="0"/>
           </a:p>
         </p:txBody>
       </p:sp>
+      <p:pic>
+        <p:nvPicPr>
+          <p:cNvPr id="7" name="Picture 6" descr="Diagram&#10;&#10;Description automatically generated">
+            <a:extLst>
+              <a:ext uri="{FF2B5EF4-FFF2-40B4-BE49-F238E27FC236}">
+                <a16:creationId xmlns:a16="http://schemas.microsoft.com/office/drawing/2014/main" id="{2539D705-ED6C-4F84-9EFD-84EEDF6FE0D8}"/>
+              </a:ext>
+            </a:extLst>
+          </p:cNvPr>
+          <p:cNvPicPr>
+            <a:picLocks noChangeAspect="1"/>
+          </p:cNvPicPr>
+          <p:nvPr/>
+        </p:nvPicPr>
+        <p:blipFill>
+          <a:blip r:embed="rId2"/>
+          <a:stretch>
+            <a:fillRect/>
+          </a:stretch>
+        </p:blipFill>
+        <p:spPr>
+          <a:xfrm>
+            <a:off x="1838681" y="2936757"/>
+            <a:ext cx="5695238" cy="4428571"/>
+          </a:xfrm>
+          <a:prstGeom prst="rect">
+            <a:avLst/>
+          </a:prstGeom>
+        </p:spPr>
+      </p:pic>
     </p:spTree>
   </p:cSld>
   <p:clrMapOvr>
@@ -9202,29 +9380,6 @@
       </p:sp>
       <p:sp>
         <p:nvSpPr>
-          <p:cNvPr id="3" name="Content Placeholder 2"/>
-          <p:cNvSpPr>
-            <a:spLocks noGrp="1"/>
-          </p:cNvSpPr>
-          <p:nvPr>
-            <p:ph idx="1"/>
-          </p:nvPr>
-        </p:nvSpPr>
-        <p:spPr/>
-        <p:txBody>
-          <a:bodyPr/>
-          <a:lstStyle/>
-          <a:p>
-            <a:r>
-              <a:rPr lang="en-US" dirty="0"/>
-              <a:t>&lt;&lt; Diagram to be inserted – Summary&gt;&gt;</a:t>
-            </a:r>
-            <a:endParaRPr lang="en-CA" dirty="0"/>
-          </a:p>
-        </p:txBody>
-      </p:sp>
-      <p:sp>
-        <p:nvSpPr>
           <p:cNvPr id="4" name="Footer Placeholder 3"/>
           <p:cNvSpPr>
             <a:spLocks noGrp="1"/>
@@ -9269,12 +9424,459 @@
             </a:pPr>
             <a:fld id="{77EF9825-4C23-4085-A4E3-B5565466BD91}" type="slidenum">
               <a:rPr lang="en-US" smtClean="0"/>
+              <a:t>32</a:t>
             </a:fld>
             <a:endParaRPr lang="en-US" dirty="0"/>
           </a:p>
         </p:txBody>
       </p:sp>
+      <p:pic>
+        <p:nvPicPr>
+          <p:cNvPr id="9" name="Picture 8" descr="Diagram&#10;&#10;Description automatically generated">
+            <a:extLst>
+              <a:ext uri="{FF2B5EF4-FFF2-40B4-BE49-F238E27FC236}">
+                <a16:creationId xmlns:a16="http://schemas.microsoft.com/office/drawing/2014/main" id="{D41610B2-2D53-4AD6-9BD7-3C4A39812907}"/>
+              </a:ext>
+            </a:extLst>
+          </p:cNvPr>
+          <p:cNvPicPr>
+            <a:picLocks noChangeAspect="1"/>
+          </p:cNvPicPr>
+          <p:nvPr/>
+        </p:nvPicPr>
+        <p:blipFill>
+          <a:blip r:embed="rId2"/>
+          <a:stretch>
+            <a:fillRect/>
+          </a:stretch>
+        </p:blipFill>
+        <p:spPr>
+          <a:xfrm>
+            <a:off x="1485900" y="948531"/>
+            <a:ext cx="6919193" cy="6708393"/>
+          </a:xfrm>
+          <a:prstGeom prst="rect">
+            <a:avLst/>
+          </a:prstGeom>
+        </p:spPr>
+      </p:pic>
     </p:spTree>
+  </p:cSld>
+  <p:clrMapOvr>
+    <a:masterClrMapping/>
+  </p:clrMapOvr>
+</p:sld>
+</file>
+
+<file path=ppt/slides/slide33.xml><?xml version="1.0" encoding="utf-8"?>
+<p:sld xmlns:a="http://schemas.openxmlformats.org/drawingml/2006/main" xmlns:r="http://schemas.openxmlformats.org/officeDocument/2006/relationships" xmlns:p="http://schemas.openxmlformats.org/presentationml/2006/main">
+  <p:cSld>
+    <p:spTree>
+      <p:nvGrpSpPr>
+        <p:cNvPr id="1" name=""/>
+        <p:cNvGrpSpPr/>
+        <p:nvPr/>
+      </p:nvGrpSpPr>
+      <p:grpSpPr>
+        <a:xfrm>
+          <a:off x="0" y="0"/>
+          <a:ext cx="0" cy="0"/>
+          <a:chOff x="0" y="0"/>
+          <a:chExt cx="0" cy="0"/>
+        </a:xfrm>
+      </p:grpSpPr>
+      <p:sp>
+        <p:nvSpPr>
+          <p:cNvPr id="2" name="Title 1">
+            <a:extLst>
+              <a:ext uri="{FF2B5EF4-FFF2-40B4-BE49-F238E27FC236}">
+                <a16:creationId xmlns:a16="http://schemas.microsoft.com/office/drawing/2014/main" id="{2678D863-177D-4422-A93F-353A84E97FA5}"/>
+              </a:ext>
+            </a:extLst>
+          </p:cNvPr>
+          <p:cNvSpPr>
+            <a:spLocks noGrp="1"/>
+          </p:cNvSpPr>
+          <p:nvPr>
+            <p:ph type="title"/>
+          </p:nvPr>
+        </p:nvSpPr>
+        <p:spPr/>
+        <p:txBody>
+          <a:bodyPr/>
+          <a:lstStyle/>
+          <a:p>
+            <a:r>
+              <a:rPr lang="en-US" dirty="0"/>
+              <a:t>Layer One Attacks</a:t>
+            </a:r>
+            <a:endParaRPr lang="en-CA" dirty="0"/>
+          </a:p>
+        </p:txBody>
+      </p:sp>
+      <p:sp>
+        <p:nvSpPr>
+          <p:cNvPr id="3" name="Content Placeholder 2">
+            <a:extLst>
+              <a:ext uri="{FF2B5EF4-FFF2-40B4-BE49-F238E27FC236}">
+                <a16:creationId xmlns:a16="http://schemas.microsoft.com/office/drawing/2014/main" id="{A851E11E-1FBB-4CC8-9F7A-33AE76F93030}"/>
+              </a:ext>
+            </a:extLst>
+          </p:cNvPr>
+          <p:cNvSpPr>
+            <a:spLocks noGrp="1"/>
+          </p:cNvSpPr>
+          <p:nvPr>
+            <p:ph idx="1"/>
+          </p:nvPr>
+        </p:nvSpPr>
+        <p:spPr/>
+        <p:txBody>
+          <a:bodyPr/>
+          <a:lstStyle/>
+          <a:p>
+            <a:r>
+              <a:rPr lang="en-US" dirty="0"/>
+              <a:t>Traditional cybersecurity improvements push attackers toward alternative paths</a:t>
+            </a:r>
+          </a:p>
+          <a:p>
+            <a:pPr lvl="1"/>
+            <a:r>
+              <a:rPr lang="en-US" dirty="0"/>
+              <a:t>The physical layer has become a fertile ground for attacks</a:t>
+            </a:r>
+          </a:p>
+          <a:p>
+            <a:pPr lvl="1"/>
+            <a:r>
+              <a:rPr lang="en-US" dirty="0"/>
+              <a:t>Effectively, the soft underbelly of cybersecurity</a:t>
+            </a:r>
+          </a:p>
+          <a:p>
+            <a:r>
+              <a:rPr lang="en-US" dirty="0"/>
+              <a:t>Can take the form of a compromised employee planting a device on the network</a:t>
+            </a:r>
+          </a:p>
+          <a:p>
+            <a:r>
+              <a:rPr lang="en-US" dirty="0"/>
+              <a:t>Rogue and insecure hardware is often missed during security audits</a:t>
+            </a:r>
+          </a:p>
+          <a:p>
+            <a:pPr lvl="1"/>
+            <a:r>
+              <a:rPr lang="en-US" dirty="0"/>
+              <a:t>Legitimate hardware can be altered to provide insecure access</a:t>
+            </a:r>
+          </a:p>
+          <a:p>
+            <a:r>
+              <a:rPr lang="en-US" dirty="0"/>
+              <a:t>Zero-trust network security causes attackers to look at physical access via hardware exploits</a:t>
+            </a:r>
+          </a:p>
+          <a:p>
+            <a:pPr lvl="1"/>
+            <a:r>
+              <a:rPr lang="en-US" dirty="0"/>
+              <a:t>Even air-gapping is not an effective solution</a:t>
+            </a:r>
+          </a:p>
+          <a:p>
+            <a:pPr lvl="1"/>
+            <a:r>
+              <a:rPr lang="en-US" dirty="0"/>
+              <a:t>For example, STUXNET</a:t>
+            </a:r>
+          </a:p>
+          <a:p>
+            <a:endParaRPr lang="en-CA" dirty="0"/>
+          </a:p>
+        </p:txBody>
+      </p:sp>
+      <p:sp>
+        <p:nvSpPr>
+          <p:cNvPr id="4" name="Footer Placeholder 3">
+            <a:extLst>
+              <a:ext uri="{FF2B5EF4-FFF2-40B4-BE49-F238E27FC236}">
+                <a16:creationId xmlns:a16="http://schemas.microsoft.com/office/drawing/2014/main" id="{EBC56D9F-17B5-4088-8901-BC3201E9B4F9}"/>
+              </a:ext>
+            </a:extLst>
+          </p:cNvPr>
+          <p:cNvSpPr>
+            <a:spLocks noGrp="1"/>
+          </p:cNvSpPr>
+          <p:nvPr>
+            <p:ph type="ftr" sz="quarter" idx="11"/>
+          </p:nvPr>
+        </p:nvSpPr>
+        <p:spPr/>
+        <p:txBody>
+          <a:bodyPr/>
+          <a:lstStyle/>
+          <a:p>
+            <a:pPr algn="l">
+              <a:defRPr/>
+            </a:pPr>
+            <a:r>
+              <a:rPr lang="en-US"/>
+              <a:t>Copyright © 2021 Elephant Scale. All rights reserved.</a:t>
+            </a:r>
+            <a:endParaRPr lang="en-US" dirty="0"/>
+          </a:p>
+        </p:txBody>
+      </p:sp>
+      <p:sp>
+        <p:nvSpPr>
+          <p:cNvPr id="5" name="Slide Number Placeholder 4">
+            <a:extLst>
+              <a:ext uri="{FF2B5EF4-FFF2-40B4-BE49-F238E27FC236}">
+                <a16:creationId xmlns:a16="http://schemas.microsoft.com/office/drawing/2014/main" id="{87CA0D83-08E4-4B1E-87F4-585E80013196}"/>
+              </a:ext>
+            </a:extLst>
+          </p:cNvPr>
+          <p:cNvSpPr>
+            <a:spLocks noGrp="1"/>
+          </p:cNvSpPr>
+          <p:nvPr>
+            <p:ph type="sldNum" sz="quarter" idx="12"/>
+          </p:nvPr>
+        </p:nvSpPr>
+        <p:spPr/>
+        <p:txBody>
+          <a:bodyPr/>
+          <a:lstStyle/>
+          <a:p>
+            <a:pPr>
+              <a:defRPr/>
+            </a:pPr>
+            <a:fld id="{77EF9825-4C23-4085-A4E3-B5565466BD91}" type="slidenum">
+              <a:rPr lang="en-US" smtClean="0"/>
+              <a:t>33</a:t>
+            </a:fld>
+            <a:endParaRPr lang="en-US" dirty="0"/>
+          </a:p>
+        </p:txBody>
+      </p:sp>
+    </p:spTree>
+    <p:extLst>
+      <p:ext uri="{BB962C8B-B14F-4D97-AF65-F5344CB8AC3E}">
+        <p14:creationId xmlns:p14="http://schemas.microsoft.com/office/powerpoint/2010/main" val="3985288914"/>
+      </p:ext>
+    </p:extLst>
+  </p:cSld>
+  <p:clrMapOvr>
+    <a:masterClrMapping/>
+  </p:clrMapOvr>
+</p:sld>
+</file>
+
+<file path=ppt/slides/slide34.xml><?xml version="1.0" encoding="utf-8"?>
+<p:sld xmlns:a="http://schemas.openxmlformats.org/drawingml/2006/main" xmlns:r="http://schemas.openxmlformats.org/officeDocument/2006/relationships" xmlns:p="http://schemas.openxmlformats.org/presentationml/2006/main">
+  <p:cSld>
+    <p:spTree>
+      <p:nvGrpSpPr>
+        <p:cNvPr id="1" name=""/>
+        <p:cNvGrpSpPr/>
+        <p:nvPr/>
+      </p:nvGrpSpPr>
+      <p:grpSpPr>
+        <a:xfrm>
+          <a:off x="0" y="0"/>
+          <a:ext cx="0" cy="0"/>
+          <a:chOff x="0" y="0"/>
+          <a:chExt cx="0" cy="0"/>
+        </a:xfrm>
+      </p:grpSpPr>
+      <p:sp>
+        <p:nvSpPr>
+          <p:cNvPr id="2" name="Title 1">
+            <a:extLst>
+              <a:ext uri="{FF2B5EF4-FFF2-40B4-BE49-F238E27FC236}">
+                <a16:creationId xmlns:a16="http://schemas.microsoft.com/office/drawing/2014/main" id="{2678D863-177D-4422-A93F-353A84E97FA5}"/>
+              </a:ext>
+            </a:extLst>
+          </p:cNvPr>
+          <p:cNvSpPr>
+            <a:spLocks noGrp="1"/>
+          </p:cNvSpPr>
+          <p:nvPr>
+            <p:ph type="title"/>
+          </p:nvPr>
+        </p:nvSpPr>
+        <p:spPr/>
+        <p:txBody>
+          <a:bodyPr/>
+          <a:lstStyle/>
+          <a:p>
+            <a:r>
+              <a:rPr lang="en-US" dirty="0"/>
+              <a:t>Hardware Security Challenges</a:t>
+            </a:r>
+            <a:endParaRPr lang="en-CA" dirty="0"/>
+          </a:p>
+        </p:txBody>
+      </p:sp>
+      <p:sp>
+        <p:nvSpPr>
+          <p:cNvPr id="3" name="Content Placeholder 2">
+            <a:extLst>
+              <a:ext uri="{FF2B5EF4-FFF2-40B4-BE49-F238E27FC236}">
+                <a16:creationId xmlns:a16="http://schemas.microsoft.com/office/drawing/2014/main" id="{A851E11E-1FBB-4CC8-9F7A-33AE76F93030}"/>
+              </a:ext>
+            </a:extLst>
+          </p:cNvPr>
+          <p:cNvSpPr>
+            <a:spLocks noGrp="1"/>
+          </p:cNvSpPr>
+          <p:nvPr>
+            <p:ph idx="1"/>
+          </p:nvPr>
+        </p:nvSpPr>
+        <p:spPr/>
+        <p:txBody>
+          <a:bodyPr/>
+          <a:lstStyle/>
+          <a:p>
+            <a:r>
+              <a:rPr lang="en-US" dirty="0"/>
+              <a:t>Firmware can be updated with compromised versions</a:t>
+            </a:r>
+          </a:p>
+          <a:p>
+            <a:pPr lvl="1"/>
+            <a:r>
+              <a:rPr lang="en-US" dirty="0"/>
+              <a:t>Often overlooked in security testing</a:t>
+            </a:r>
+          </a:p>
+          <a:p>
+            <a:r>
+              <a:rPr lang="en-US" dirty="0"/>
+              <a:t>Recommended mitigation</a:t>
+            </a:r>
+          </a:p>
+          <a:p>
+            <a:pPr lvl="1"/>
+            <a:r>
+              <a:rPr lang="en-US" dirty="0"/>
+              <a:t>automated security validation tools that can scan for configuration anomalies within their platform and evaluate security-sensitive bits within their firmware</a:t>
+            </a:r>
+          </a:p>
+          <a:p>
+            <a:r>
+              <a:rPr lang="en-US" dirty="0"/>
+              <a:t>Hardware uses multiple components from different manufacturers, each using a different supply chain</a:t>
+            </a:r>
+          </a:p>
+          <a:p>
+            <a:pPr lvl="1"/>
+            <a:r>
+              <a:rPr lang="en-US" dirty="0"/>
+              <a:t>Security has to be enforced across the supply chain</a:t>
+            </a:r>
+          </a:p>
+          <a:p>
+            <a:r>
+              <a:rPr lang="en-US" dirty="0"/>
+              <a:t>Problem made more urgent by the increased use of  systems on chips (SoCs)</a:t>
+            </a:r>
+          </a:p>
+          <a:p>
+            <a:pPr lvl="1"/>
+            <a:r>
+              <a:rPr lang="en-US" dirty="0"/>
+              <a:t>SoCs consolidate multiple traditional components on a single chip</a:t>
+            </a:r>
+          </a:p>
+          <a:p>
+            <a:pPr lvl="1"/>
+            <a:r>
+              <a:rPr lang="en-US" dirty="0"/>
+              <a:t>Bypasses the more traditional network </a:t>
+            </a:r>
+            <a:r>
+              <a:rPr lang="en-US"/>
+              <a:t>security analysis</a:t>
+            </a:r>
+            <a:endParaRPr lang="en-CA" dirty="0"/>
+          </a:p>
+        </p:txBody>
+      </p:sp>
+      <p:sp>
+        <p:nvSpPr>
+          <p:cNvPr id="4" name="Footer Placeholder 3">
+            <a:extLst>
+              <a:ext uri="{FF2B5EF4-FFF2-40B4-BE49-F238E27FC236}">
+                <a16:creationId xmlns:a16="http://schemas.microsoft.com/office/drawing/2014/main" id="{EBC56D9F-17B5-4088-8901-BC3201E9B4F9}"/>
+              </a:ext>
+            </a:extLst>
+          </p:cNvPr>
+          <p:cNvSpPr>
+            <a:spLocks noGrp="1"/>
+          </p:cNvSpPr>
+          <p:nvPr>
+            <p:ph type="ftr" sz="quarter" idx="11"/>
+          </p:nvPr>
+        </p:nvSpPr>
+        <p:spPr/>
+        <p:txBody>
+          <a:bodyPr/>
+          <a:lstStyle/>
+          <a:p>
+            <a:pPr algn="l">
+              <a:defRPr/>
+            </a:pPr>
+            <a:r>
+              <a:rPr lang="en-US"/>
+              <a:t>Copyright © 2021 Elephant Scale. All rights reserved.</a:t>
+            </a:r>
+            <a:endParaRPr lang="en-US" dirty="0"/>
+          </a:p>
+        </p:txBody>
+      </p:sp>
+      <p:sp>
+        <p:nvSpPr>
+          <p:cNvPr id="5" name="Slide Number Placeholder 4">
+            <a:extLst>
+              <a:ext uri="{FF2B5EF4-FFF2-40B4-BE49-F238E27FC236}">
+                <a16:creationId xmlns:a16="http://schemas.microsoft.com/office/drawing/2014/main" id="{87CA0D83-08E4-4B1E-87F4-585E80013196}"/>
+              </a:ext>
+            </a:extLst>
+          </p:cNvPr>
+          <p:cNvSpPr>
+            <a:spLocks noGrp="1"/>
+          </p:cNvSpPr>
+          <p:nvPr>
+            <p:ph type="sldNum" sz="quarter" idx="12"/>
+          </p:nvPr>
+        </p:nvSpPr>
+        <p:spPr/>
+        <p:txBody>
+          <a:bodyPr/>
+          <a:lstStyle/>
+          <a:p>
+            <a:pPr>
+              <a:defRPr/>
+            </a:pPr>
+            <a:fld id="{77EF9825-4C23-4085-A4E3-B5565466BD91}" type="slidenum">
+              <a:rPr lang="en-US" smtClean="0"/>
+              <a:t>34</a:t>
+            </a:fld>
+            <a:endParaRPr lang="en-US" dirty="0"/>
+          </a:p>
+        </p:txBody>
+      </p:sp>
+    </p:spTree>
+    <p:extLst>
+      <p:ext uri="{BB962C8B-B14F-4D97-AF65-F5344CB8AC3E}">
+        <p14:creationId xmlns:p14="http://schemas.microsoft.com/office/powerpoint/2010/main" val="3333288994"/>
+      </p:ext>
+    </p:extLst>
   </p:cSld>
   <p:clrMapOvr>
     <a:masterClrMapping/>
@@ -9346,7 +9948,6 @@
               <a:rPr lang="en-US" dirty="0"/>
               <a:t>Maps to various implementations</a:t>
             </a:r>
-            <a:endParaRPr lang="en-US" dirty="0"/>
           </a:p>
           <a:p>
             <a:r>
@@ -9387,11 +9988,6 @@
               </a:rPr>
               <a:t>Copyright © 2021 by Elephant Scale, All Rights Reserved</a:t>
             </a:r>
-            <a:endParaRPr sz="800">
-              <a:solidFill>
-                <a:srgbClr val="000000"/>
-              </a:solidFill>
-            </a:endParaRPr>
           </a:p>
         </p:txBody>
       </p:sp>
@@ -9404,7 +10000,7 @@
           <p:nvPr/>
         </p:nvPicPr>
         <p:blipFill>
-          <a:blip r:embed="rId1"/>
+          <a:blip r:embed="rId3"/>
           <a:stretch>
             <a:fillRect/>
           </a:stretch>
@@ -9432,12 +10028,14 @@
         <p:spPr/>
         <p:txBody>
           <a:bodyPr/>
+          <a:lstStyle/>
           <a:p>
             <a:pPr>
               <a:defRPr/>
             </a:pPr>
             <a:fld id="{77EF9825-4C23-4085-A4E3-B5565466BD91}" type="slidenum">
               <a:rPr lang="en-US" smtClean="0"/>
+              <a:t>4</a:t>
             </a:fld>
             <a:endParaRPr lang="en-US" dirty="0"/>
           </a:p>
@@ -9456,6 +10054,7 @@
         <p:spPr/>
         <p:txBody>
           <a:bodyPr/>
+          <a:lstStyle/>
           <a:p>
             <a:pPr algn="l">
               <a:defRPr/>
@@ -9464,7 +10063,6 @@
               <a:rPr lang="en-US" dirty="0"/>
               <a:t>Copyright © 2021 Elephant Scale. All rights reserved.</a:t>
             </a:r>
-            <a:endParaRPr lang="en-US" dirty="0"/>
           </a:p>
         </p:txBody>
       </p:sp>
@@ -9540,7 +10138,6 @@
               <a:rPr lang="en-US" dirty="0"/>
               <a:t>OSI maps to different protocols and standards for web and IoT worlds</a:t>
             </a:r>
-            <a:endParaRPr lang="en-US" dirty="0"/>
           </a:p>
         </p:txBody>
       </p:sp>
@@ -9574,11 +10171,6 @@
               </a:rPr>
               <a:t>Copyright © 2021 by Elephant Scale, All Rights Reserved</a:t>
             </a:r>
-            <a:endParaRPr sz="800">
-              <a:solidFill>
-                <a:srgbClr val="000000"/>
-              </a:solidFill>
-            </a:endParaRPr>
           </a:p>
         </p:txBody>
       </p:sp>
@@ -9591,7 +10183,7 @@
           <p:nvPr/>
         </p:nvPicPr>
         <p:blipFill>
-          <a:blip r:embed="rId1"/>
+          <a:blip r:embed="rId3"/>
           <a:stretch>
             <a:fillRect/>
           </a:stretch>
@@ -9619,12 +10211,14 @@
         <p:spPr/>
         <p:txBody>
           <a:bodyPr/>
+          <a:lstStyle/>
           <a:p>
             <a:pPr>
               <a:defRPr/>
             </a:pPr>
             <a:fld id="{77EF9825-4C23-4085-A4E3-B5565466BD91}" type="slidenum">
               <a:rPr lang="en-US" smtClean="0"/>
+              <a:t>5</a:t>
             </a:fld>
             <a:endParaRPr lang="en-US" dirty="0"/>
           </a:p>
@@ -9643,6 +10237,7 @@
         <p:spPr/>
         <p:txBody>
           <a:bodyPr/>
+          <a:lstStyle/>
           <a:p>
             <a:pPr algn="l">
               <a:defRPr/>
@@ -9651,7 +10246,6 @@
               <a:rPr lang="en-US" dirty="0"/>
               <a:t>Copyright © 2021 Elephant Scale. All rights reserved.</a:t>
             </a:r>
-            <a:endParaRPr lang="en-US" dirty="0"/>
           </a:p>
         </p:txBody>
       </p:sp>
@@ -9722,14 +10316,12 @@
               <a:rPr lang="en-US" dirty="0"/>
               <a:t>Represents processes on the level of applications and users, IoT and otherwise</a:t>
             </a:r>
-            <a:endParaRPr lang="en-US" dirty="0"/>
           </a:p>
           <a:p>
             <a:r>
               <a:rPr lang="en-US" dirty="0"/>
               <a:t>Links the business application access to network services</a:t>
             </a:r>
-            <a:endParaRPr lang="en-US" dirty="0"/>
           </a:p>
           <a:p>
             <a:r>
@@ -9751,7 +10343,7 @@
           </p:nvPr>
         </p:nvPicPr>
         <p:blipFill>
-          <a:blip r:embed="rId1"/>
+          <a:blip r:embed="rId3"/>
           <a:stretch>
             <a:fillRect/>
           </a:stretch>
@@ -9783,6 +10375,7 @@
             </a:pPr>
             <a:fld id="{77EF9825-4C23-4085-A4E3-B5565466BD91}" type="slidenum">
               <a:rPr lang="en-US" smtClean="0"/>
+              <a:t>6</a:t>
             </a:fld>
             <a:endParaRPr lang="en-US" dirty="0"/>
           </a:p>
@@ -9939,14 +10532,12 @@
               <a:rPr lang="en-US" dirty="0"/>
               <a:t>Formats and encrypts data for communication.</a:t>
             </a:r>
-            <a:endParaRPr lang="en-US" dirty="0"/>
           </a:p>
           <a:p>
             <a:r>
               <a:rPr lang="en-US" dirty="0"/>
               <a:t>Resolves compatibility issues in the communication between the application and the network. </a:t>
             </a:r>
-            <a:endParaRPr lang="en-US" dirty="0"/>
           </a:p>
           <a:p>
             <a:r>
@@ -9968,7 +10559,7 @@
           </p:nvPr>
         </p:nvPicPr>
         <p:blipFill>
-          <a:blip r:embed="rId1"/>
+          <a:blip r:embed="rId3"/>
           <a:stretch>
             <a:fillRect/>
           </a:stretch>
@@ -10000,6 +10591,7 @@
             </a:pPr>
             <a:fld id="{77EF9825-4C23-4085-A4E3-B5565466BD91}" type="slidenum">
               <a:rPr lang="en-US" smtClean="0"/>
+              <a:t>7</a:t>
             </a:fld>
             <a:endParaRPr lang="en-US" dirty="0"/>
           </a:p>
@@ -10156,7 +10748,6 @@
               <a:rPr lang="en-US" dirty="0"/>
               <a:t>Connections between local and remote applications are initiated, managed and terminated here</a:t>
             </a:r>
-            <a:endParaRPr lang="en-US" dirty="0"/>
           </a:p>
           <a:p>
             <a:r>
@@ -10178,7 +10769,7 @@
           </p:nvPr>
         </p:nvPicPr>
         <p:blipFill>
-          <a:blip r:embed="rId1"/>
+          <a:blip r:embed="rId3"/>
           <a:stretch>
             <a:fillRect/>
           </a:stretch>
@@ -10210,6 +10801,7 @@
             </a:pPr>
             <a:fld id="{77EF9825-4C23-4085-A4E3-B5565466BD91}" type="slidenum">
               <a:rPr lang="en-US" smtClean="0"/>
+              <a:t>8</a:t>
             </a:fld>
             <a:endParaRPr lang="en-US" dirty="0"/>
           </a:p>
@@ -10366,21 +10958,18 @@
               <a:rPr lang="en-US" dirty="0"/>
               <a:t>Manages the host-to-host data transmission</a:t>
             </a:r>
-            <a:endParaRPr lang="en-US" dirty="0"/>
           </a:p>
           <a:p>
             <a:r>
               <a:rPr lang="en-US" dirty="0"/>
               <a:t>Ensures that data transfers between hosts are completed.</a:t>
             </a:r>
-            <a:endParaRPr lang="en-US" dirty="0"/>
           </a:p>
           <a:p>
             <a:r>
               <a:rPr lang="en-US" dirty="0"/>
               <a:t>Manages error recovery and retransmission of lost data. </a:t>
             </a:r>
-            <a:endParaRPr lang="en-US" dirty="0"/>
           </a:p>
           <a:p>
             <a:r>
@@ -10402,7 +10991,7 @@
           </p:nvPr>
         </p:nvPicPr>
         <p:blipFill>
-          <a:blip r:embed="rId1"/>
+          <a:blip r:embed="rId3"/>
           <a:stretch>
             <a:fillRect/>
           </a:stretch>
@@ -10434,6 +11023,7 @@
             </a:pPr>
             <a:fld id="{77EF9825-4C23-4085-A4E3-B5565466BD91}" type="slidenum">
               <a:rPr lang="en-US" smtClean="0"/>
+              <a:t>9</a:t>
             </a:fld>
             <a:endParaRPr lang="en-US" dirty="0"/>
           </a:p>
@@ -11472,6 +12062,7 @@
       </a:style>
     </a:lnDef>
   </a:objectDefaults>
+  <a:extraClrSchemeLst/>
   <a:extLst>
     <a:ext uri="{05A4C25C-085E-4340-85A3-A5531E510DB2}">
       <thm15:themeFamily xmlns:thm15="http://schemas.microsoft.com/office/thememl/2012/main" name="Office Theme" id="{62F939B6-93AF-4DB8-9C6B-D6C7DFDC589F}" vid="{4A3C46E8-61CC-4603-A589-7422A47A8E4A}"/>
@@ -11794,6 +12385,7 @@
       </a:style>
     </a:lnDef>
   </a:objectDefaults>
+  <a:extraClrSchemeLst/>
   <a:extLst>
     <a:ext uri="{05A4C25C-085E-4340-85A3-A5531E510DB2}">
       <thm15:themeFamily xmlns:thm15="http://schemas.microsoft.com/office/thememl/2012/main" name="Office Theme" id="{62F939B6-93AF-4DB8-9C6B-D6C7DFDC589F}" vid="{4A3C46E8-61CC-4603-A589-7422A47A8E4A}"/>

</xml_diff>